<commit_message>
Added sidepane and postit structure
</commit_message>
<xml_diff>
--- a/Showcase_example/Bioinformatics_Wiki_QA_proposal.pptx
+++ b/Showcase_example/Bioinformatics_Wiki_QA_proposal.pptx
@@ -20,6 +20,8 @@
     <p:sldId id="268" r:id="rId14"/>
     <p:sldId id="270" r:id="rId15"/>
     <p:sldId id="259" r:id="rId16"/>
+    <p:sldId id="271" r:id="rId17"/>
+    <p:sldId id="272" r:id="rId18"/>
   </p:sldIdLst>
   <p:sldSz cx="9144000" cy="6858000" type="screen4x3"/>
   <p:notesSz cx="6858000" cy="9144000"/>
@@ -303,7 +305,7 @@
             <a:fld id="{1D8BD707-D9CF-40AE-B4C6-C98DA3205C09}" type="datetimeFigureOut">
               <a:rPr lang="en-US" smtClean="0"/>
               <a:pPr/>
-              <a:t>6/12/2014</a:t>
+              <a:t>7/24/2014</a:t>
             </a:fld>
             <a:endParaRPr lang="en-US"/>
           </a:p>
@@ -470,7 +472,7 @@
             <a:fld id="{1D8BD707-D9CF-40AE-B4C6-C98DA3205C09}" type="datetimeFigureOut">
               <a:rPr lang="en-US" smtClean="0"/>
               <a:pPr/>
-              <a:t>6/12/2014</a:t>
+              <a:t>7/24/2014</a:t>
             </a:fld>
             <a:endParaRPr lang="en-US"/>
           </a:p>
@@ -647,7 +649,7 @@
             <a:fld id="{1D8BD707-D9CF-40AE-B4C6-C98DA3205C09}" type="datetimeFigureOut">
               <a:rPr lang="en-US" smtClean="0"/>
               <a:pPr/>
-              <a:t>6/12/2014</a:t>
+              <a:t>7/24/2014</a:t>
             </a:fld>
             <a:endParaRPr lang="en-US"/>
           </a:p>
@@ -814,7 +816,7 @@
             <a:fld id="{1D8BD707-D9CF-40AE-B4C6-C98DA3205C09}" type="datetimeFigureOut">
               <a:rPr lang="en-US" smtClean="0"/>
               <a:pPr/>
-              <a:t>6/12/2014</a:t>
+              <a:t>7/24/2014</a:t>
             </a:fld>
             <a:endParaRPr lang="en-US"/>
           </a:p>
@@ -1057,7 +1059,7 @@
             <a:fld id="{1D8BD707-D9CF-40AE-B4C6-C98DA3205C09}" type="datetimeFigureOut">
               <a:rPr lang="en-US" smtClean="0"/>
               <a:pPr/>
-              <a:t>6/12/2014</a:t>
+              <a:t>7/24/2014</a:t>
             </a:fld>
             <a:endParaRPr lang="en-US"/>
           </a:p>
@@ -1342,7 +1344,7 @@
             <a:fld id="{1D8BD707-D9CF-40AE-B4C6-C98DA3205C09}" type="datetimeFigureOut">
               <a:rPr lang="en-US" smtClean="0"/>
               <a:pPr/>
-              <a:t>6/12/2014</a:t>
+              <a:t>7/24/2014</a:t>
             </a:fld>
             <a:endParaRPr lang="en-US"/>
           </a:p>
@@ -1761,7 +1763,7 @@
             <a:fld id="{1D8BD707-D9CF-40AE-B4C6-C98DA3205C09}" type="datetimeFigureOut">
               <a:rPr lang="en-US" smtClean="0"/>
               <a:pPr/>
-              <a:t>6/12/2014</a:t>
+              <a:t>7/24/2014</a:t>
             </a:fld>
             <a:endParaRPr lang="en-US"/>
           </a:p>
@@ -1876,7 +1878,7 @@
             <a:fld id="{1D8BD707-D9CF-40AE-B4C6-C98DA3205C09}" type="datetimeFigureOut">
               <a:rPr lang="en-US" smtClean="0"/>
               <a:pPr/>
-              <a:t>6/12/2014</a:t>
+              <a:t>7/24/2014</a:t>
             </a:fld>
             <a:endParaRPr lang="en-US"/>
           </a:p>
@@ -1968,7 +1970,7 @@
             <a:fld id="{1D8BD707-D9CF-40AE-B4C6-C98DA3205C09}" type="datetimeFigureOut">
               <a:rPr lang="en-US" smtClean="0"/>
               <a:pPr/>
-              <a:t>6/12/2014</a:t>
+              <a:t>7/24/2014</a:t>
             </a:fld>
             <a:endParaRPr lang="en-US"/>
           </a:p>
@@ -2242,7 +2244,7 @@
             <a:fld id="{1D8BD707-D9CF-40AE-B4C6-C98DA3205C09}" type="datetimeFigureOut">
               <a:rPr lang="en-US" smtClean="0"/>
               <a:pPr/>
-              <a:t>6/12/2014</a:t>
+              <a:t>7/24/2014</a:t>
             </a:fld>
             <a:endParaRPr lang="en-US"/>
           </a:p>
@@ -2492,7 +2494,7 @@
             <a:fld id="{1D8BD707-D9CF-40AE-B4C6-C98DA3205C09}" type="datetimeFigureOut">
               <a:rPr lang="en-US" smtClean="0"/>
               <a:pPr/>
-              <a:t>6/12/2014</a:t>
+              <a:t>7/24/2014</a:t>
             </a:fld>
             <a:endParaRPr lang="en-US"/>
           </a:p>
@@ -2702,7 +2704,7 @@
             <a:fld id="{1D8BD707-D9CF-40AE-B4C6-C98DA3205C09}" type="datetimeFigureOut">
               <a:rPr lang="en-US" smtClean="0"/>
               <a:pPr/>
-              <a:t>6/12/2014</a:t>
+              <a:t>7/24/2014</a:t>
             </a:fld>
             <a:endParaRPr lang="en-US"/>
           </a:p>
@@ -5737,6 +5739,156 @@
 </p:sld>
 </file>
 
+<file path=ppt/slides/slide16.xml><?xml version="1.0" encoding="utf-8"?>
+<p:sld xmlns:a="http://schemas.openxmlformats.org/drawingml/2006/main" xmlns:r="http://schemas.openxmlformats.org/officeDocument/2006/relationships" xmlns:p="http://schemas.openxmlformats.org/presentationml/2006/main">
+  <p:cSld>
+    <p:spTree>
+      <p:nvGrpSpPr>
+        <p:cNvPr id="1" name=""/>
+        <p:cNvGrpSpPr/>
+        <p:nvPr/>
+      </p:nvGrpSpPr>
+      <p:grpSpPr>
+        <a:xfrm>
+          <a:off x="0" y="0"/>
+          <a:ext cx="0" cy="0"/>
+          <a:chOff x="0" y="0"/>
+          <a:chExt cx="0" cy="0"/>
+        </a:xfrm>
+      </p:grpSpPr>
+      <p:sp>
+        <p:nvSpPr>
+          <p:cNvPr id="2" name="Title 1"/>
+          <p:cNvSpPr>
+            <a:spLocks noGrp="1"/>
+          </p:cNvSpPr>
+          <p:nvPr>
+            <p:ph type="title"/>
+          </p:nvPr>
+        </p:nvSpPr>
+        <p:spPr/>
+        <p:txBody>
+          <a:bodyPr/>
+          <a:lstStyle/>
+          <a:p>
+            <a:r>
+              <a:rPr lang="en-US" dirty="0" smtClean="0"/>
+              <a:t>User Stories</a:t>
+            </a:r>
+            <a:endParaRPr lang="en-US" dirty="0"/>
+          </a:p>
+        </p:txBody>
+      </p:sp>
+      <p:sp>
+        <p:nvSpPr>
+          <p:cNvPr id="3" name="Content Placeholder 2"/>
+          <p:cNvSpPr>
+            <a:spLocks noGrp="1"/>
+          </p:cNvSpPr>
+          <p:nvPr>
+            <p:ph idx="1"/>
+          </p:nvPr>
+        </p:nvSpPr>
+        <p:spPr/>
+        <p:txBody>
+          <a:bodyPr/>
+          <a:lstStyle/>
+          <a:p>
+            <a:r>
+              <a:rPr lang="en-US" dirty="0" smtClean="0"/>
+              <a:t>Wiki Page</a:t>
+            </a:r>
+          </a:p>
+          <a:p>
+            <a:endParaRPr lang="en-US" dirty="0"/>
+          </a:p>
+        </p:txBody>
+      </p:sp>
+    </p:spTree>
+    <p:extLst>
+      <p:ext uri="{BB962C8B-B14F-4D97-AF65-F5344CB8AC3E}">
+        <p14:creationId xmlns:p14="http://schemas.microsoft.com/office/powerpoint/2010/main" val="3229278775"/>
+      </p:ext>
+    </p:extLst>
+  </p:cSld>
+  <p:clrMapOvr>
+    <a:masterClrMapping/>
+  </p:clrMapOvr>
+</p:sld>
+</file>
+
+<file path=ppt/slides/slide17.xml><?xml version="1.0" encoding="utf-8"?>
+<p:sld xmlns:a="http://schemas.openxmlformats.org/drawingml/2006/main" xmlns:r="http://schemas.openxmlformats.org/officeDocument/2006/relationships" xmlns:p="http://schemas.openxmlformats.org/presentationml/2006/main">
+  <p:cSld>
+    <p:spTree>
+      <p:nvGrpSpPr>
+        <p:cNvPr id="1" name=""/>
+        <p:cNvGrpSpPr/>
+        <p:nvPr/>
+      </p:nvGrpSpPr>
+      <p:grpSpPr>
+        <a:xfrm>
+          <a:off x="0" y="0"/>
+          <a:ext cx="0" cy="0"/>
+          <a:chOff x="0" y="0"/>
+          <a:chExt cx="0" cy="0"/>
+        </a:xfrm>
+      </p:grpSpPr>
+      <p:sp>
+        <p:nvSpPr>
+          <p:cNvPr id="2" name="Title 1"/>
+          <p:cNvSpPr>
+            <a:spLocks noGrp="1"/>
+          </p:cNvSpPr>
+          <p:nvPr>
+            <p:ph type="title"/>
+          </p:nvPr>
+        </p:nvSpPr>
+        <p:spPr/>
+        <p:txBody>
+          <a:bodyPr/>
+          <a:lstStyle/>
+          <a:p>
+            <a:endParaRPr lang="en-US"/>
+          </a:p>
+        </p:txBody>
+      </p:sp>
+      <p:sp>
+        <p:nvSpPr>
+          <p:cNvPr id="3" name="Content Placeholder 2"/>
+          <p:cNvSpPr>
+            <a:spLocks noGrp="1"/>
+          </p:cNvSpPr>
+          <p:nvPr>
+            <p:ph idx="1"/>
+          </p:nvPr>
+        </p:nvSpPr>
+        <p:spPr/>
+        <p:txBody>
+          <a:bodyPr/>
+          <a:lstStyle/>
+          <a:p>
+            <a:r>
+              <a:rPr lang="en-US" dirty="0" smtClean="0"/>
+              <a:t>Post page</a:t>
+            </a:r>
+            <a:endParaRPr lang="en-US" dirty="0"/>
+          </a:p>
+        </p:txBody>
+      </p:sp>
+    </p:spTree>
+    <p:extLst>
+      <p:ext uri="{BB962C8B-B14F-4D97-AF65-F5344CB8AC3E}">
+        <p14:creationId xmlns:p14="http://schemas.microsoft.com/office/powerpoint/2010/main" val="1968698794"/>
+      </p:ext>
+    </p:extLst>
+  </p:cSld>
+  <p:clrMapOvr>
+    <a:masterClrMapping/>
+  </p:clrMapOvr>
+</p:sld>
+</file>
+
 <file path=ppt/slides/slide2.xml><?xml version="1.0" encoding="utf-8"?>
 <p:sld xmlns:a="http://schemas.openxmlformats.org/drawingml/2006/main" xmlns:r="http://schemas.openxmlformats.org/officeDocument/2006/relationships" xmlns:p="http://schemas.openxmlformats.org/presentationml/2006/main">
   <p:cSld>

</xml_diff>

<commit_message>
to dropbox; add requirements
</commit_message>
<xml_diff>
--- a/Showcase_example/Bioinformatics_Wiki_QA_proposal.pptx
+++ b/Showcase_example/Bioinformatics_Wiki_QA_proposal.pptx
@@ -8,20 +8,24 @@
     <p:sldId id="256" r:id="rId2"/>
     <p:sldId id="258" r:id="rId3"/>
     <p:sldId id="257" r:id="rId4"/>
-    <p:sldId id="261" r:id="rId5"/>
-    <p:sldId id="260" r:id="rId6"/>
-    <p:sldId id="262" r:id="rId7"/>
-    <p:sldId id="263" r:id="rId8"/>
-    <p:sldId id="264" r:id="rId9"/>
-    <p:sldId id="265" r:id="rId10"/>
-    <p:sldId id="266" r:id="rId11"/>
-    <p:sldId id="269" r:id="rId12"/>
-    <p:sldId id="267" r:id="rId13"/>
-    <p:sldId id="268" r:id="rId14"/>
-    <p:sldId id="270" r:id="rId15"/>
-    <p:sldId id="259" r:id="rId16"/>
-    <p:sldId id="271" r:id="rId17"/>
-    <p:sldId id="272" r:id="rId18"/>
+    <p:sldId id="276" r:id="rId5"/>
+    <p:sldId id="261" r:id="rId6"/>
+    <p:sldId id="260" r:id="rId7"/>
+    <p:sldId id="262" r:id="rId8"/>
+    <p:sldId id="263" r:id="rId9"/>
+    <p:sldId id="264" r:id="rId10"/>
+    <p:sldId id="273" r:id="rId11"/>
+    <p:sldId id="265" r:id="rId12"/>
+    <p:sldId id="266" r:id="rId13"/>
+    <p:sldId id="269" r:id="rId14"/>
+    <p:sldId id="267" r:id="rId15"/>
+    <p:sldId id="268" r:id="rId16"/>
+    <p:sldId id="270" r:id="rId17"/>
+    <p:sldId id="274" r:id="rId18"/>
+    <p:sldId id="275" r:id="rId19"/>
+    <p:sldId id="259" r:id="rId20"/>
+    <p:sldId id="271" r:id="rId21"/>
+    <p:sldId id="272" r:id="rId22"/>
   </p:sldIdLst>
   <p:sldSz cx="9144000" cy="6858000" type="screen4x3"/>
   <p:notesSz cx="6858000" cy="9144000"/>
@@ -305,7 +309,7 @@
             <a:fld id="{1D8BD707-D9CF-40AE-B4C6-C98DA3205C09}" type="datetimeFigureOut">
               <a:rPr lang="en-US" smtClean="0"/>
               <a:pPr/>
-              <a:t>7/24/2014</a:t>
+              <a:t>7/28/2014</a:t>
             </a:fld>
             <a:endParaRPr lang="en-US"/>
           </a:p>
@@ -472,7 +476,7 @@
             <a:fld id="{1D8BD707-D9CF-40AE-B4C6-C98DA3205C09}" type="datetimeFigureOut">
               <a:rPr lang="en-US" smtClean="0"/>
               <a:pPr/>
-              <a:t>7/24/2014</a:t>
+              <a:t>7/28/2014</a:t>
             </a:fld>
             <a:endParaRPr lang="en-US"/>
           </a:p>
@@ -649,7 +653,7 @@
             <a:fld id="{1D8BD707-D9CF-40AE-B4C6-C98DA3205C09}" type="datetimeFigureOut">
               <a:rPr lang="en-US" smtClean="0"/>
               <a:pPr/>
-              <a:t>7/24/2014</a:t>
+              <a:t>7/28/2014</a:t>
             </a:fld>
             <a:endParaRPr lang="en-US"/>
           </a:p>
@@ -816,7 +820,7 @@
             <a:fld id="{1D8BD707-D9CF-40AE-B4C6-C98DA3205C09}" type="datetimeFigureOut">
               <a:rPr lang="en-US" smtClean="0"/>
               <a:pPr/>
-              <a:t>7/24/2014</a:t>
+              <a:t>7/28/2014</a:t>
             </a:fld>
             <a:endParaRPr lang="en-US"/>
           </a:p>
@@ -1059,7 +1063,7 @@
             <a:fld id="{1D8BD707-D9CF-40AE-B4C6-C98DA3205C09}" type="datetimeFigureOut">
               <a:rPr lang="en-US" smtClean="0"/>
               <a:pPr/>
-              <a:t>7/24/2014</a:t>
+              <a:t>7/28/2014</a:t>
             </a:fld>
             <a:endParaRPr lang="en-US"/>
           </a:p>
@@ -1344,7 +1348,7 @@
             <a:fld id="{1D8BD707-D9CF-40AE-B4C6-C98DA3205C09}" type="datetimeFigureOut">
               <a:rPr lang="en-US" smtClean="0"/>
               <a:pPr/>
-              <a:t>7/24/2014</a:t>
+              <a:t>7/28/2014</a:t>
             </a:fld>
             <a:endParaRPr lang="en-US"/>
           </a:p>
@@ -1763,7 +1767,7 @@
             <a:fld id="{1D8BD707-D9CF-40AE-B4C6-C98DA3205C09}" type="datetimeFigureOut">
               <a:rPr lang="en-US" smtClean="0"/>
               <a:pPr/>
-              <a:t>7/24/2014</a:t>
+              <a:t>7/28/2014</a:t>
             </a:fld>
             <a:endParaRPr lang="en-US"/>
           </a:p>
@@ -1878,7 +1882,7 @@
             <a:fld id="{1D8BD707-D9CF-40AE-B4C6-C98DA3205C09}" type="datetimeFigureOut">
               <a:rPr lang="en-US" smtClean="0"/>
               <a:pPr/>
-              <a:t>7/24/2014</a:t>
+              <a:t>7/28/2014</a:t>
             </a:fld>
             <a:endParaRPr lang="en-US"/>
           </a:p>
@@ -1970,7 +1974,7 @@
             <a:fld id="{1D8BD707-D9CF-40AE-B4C6-C98DA3205C09}" type="datetimeFigureOut">
               <a:rPr lang="en-US" smtClean="0"/>
               <a:pPr/>
-              <a:t>7/24/2014</a:t>
+              <a:t>7/28/2014</a:t>
             </a:fld>
             <a:endParaRPr lang="en-US"/>
           </a:p>
@@ -2244,7 +2248,7 @@
             <a:fld id="{1D8BD707-D9CF-40AE-B4C6-C98DA3205C09}" type="datetimeFigureOut">
               <a:rPr lang="en-US" smtClean="0"/>
               <a:pPr/>
-              <a:t>7/24/2014</a:t>
+              <a:t>7/28/2014</a:t>
             </a:fld>
             <a:endParaRPr lang="en-US"/>
           </a:p>
@@ -2494,7 +2498,7 @@
             <a:fld id="{1D8BD707-D9CF-40AE-B4C6-C98DA3205C09}" type="datetimeFigureOut">
               <a:rPr lang="en-US" smtClean="0"/>
               <a:pPr/>
-              <a:t>7/24/2014</a:t>
+              <a:t>7/28/2014</a:t>
             </a:fld>
             <a:endParaRPr lang="en-US"/>
           </a:p>
@@ -2704,7 +2708,7 @@
             <a:fld id="{1D8BD707-D9CF-40AE-B4C6-C98DA3205C09}" type="datetimeFigureOut">
               <a:rPr lang="en-US" smtClean="0"/>
               <a:pPr/>
-              <a:t>7/24/2014</a:t>
+              <a:t>7/28/2014</a:t>
             </a:fld>
             <a:endParaRPr lang="en-US"/>
           </a:p>
@@ -3135,6 +3139,885 @@
 </file>
 
 <file path=ppt/slides/slide10.xml><?xml version="1.0" encoding="utf-8"?>
+<p:sld xmlns:a="http://schemas.openxmlformats.org/drawingml/2006/main" xmlns:r="http://schemas.openxmlformats.org/officeDocument/2006/relationships" xmlns:p="http://schemas.openxmlformats.org/presentationml/2006/main">
+  <p:cSld>
+    <p:spTree>
+      <p:nvGrpSpPr>
+        <p:cNvPr id="1" name=""/>
+        <p:cNvGrpSpPr/>
+        <p:nvPr/>
+      </p:nvGrpSpPr>
+      <p:grpSpPr>
+        <a:xfrm>
+          <a:off x="0" y="0"/>
+          <a:ext cx="0" cy="0"/>
+          <a:chOff x="0" y="0"/>
+          <a:chExt cx="0" cy="0"/>
+        </a:xfrm>
+      </p:grpSpPr>
+      <p:sp>
+        <p:nvSpPr>
+          <p:cNvPr id="2" name="Title 1"/>
+          <p:cNvSpPr>
+            <a:spLocks noGrp="1"/>
+          </p:cNvSpPr>
+          <p:nvPr>
+            <p:ph type="title"/>
+          </p:nvPr>
+        </p:nvSpPr>
+        <p:spPr/>
+        <p:txBody>
+          <a:bodyPr/>
+          <a:lstStyle/>
+          <a:p>
+            <a:r>
+              <a:rPr lang="en-US" dirty="0" smtClean="0"/>
+              <a:t>User Profiles</a:t>
+            </a:r>
+            <a:endParaRPr lang="en-US" dirty="0"/>
+          </a:p>
+        </p:txBody>
+      </p:sp>
+      <p:sp>
+        <p:nvSpPr>
+          <p:cNvPr id="3" name="Content Placeholder 2"/>
+          <p:cNvSpPr>
+            <a:spLocks noGrp="1"/>
+          </p:cNvSpPr>
+          <p:nvPr>
+            <p:ph idx="1"/>
+          </p:nvPr>
+        </p:nvSpPr>
+        <p:spPr/>
+        <p:txBody>
+          <a:bodyPr/>
+          <a:lstStyle/>
+          <a:p>
+            <a:endParaRPr lang="en-US"/>
+          </a:p>
+        </p:txBody>
+      </p:sp>
+    </p:spTree>
+    <p:extLst>
+      <p:ext uri="{BB962C8B-B14F-4D97-AF65-F5344CB8AC3E}">
+        <p14:creationId xmlns:p14="http://schemas.microsoft.com/office/powerpoint/2010/main" val="863324162"/>
+      </p:ext>
+    </p:extLst>
+  </p:cSld>
+  <p:clrMapOvr>
+    <a:masterClrMapping/>
+  </p:clrMapOvr>
+</p:sld>
+</file>
+
+<file path=ppt/slides/slide11.xml><?xml version="1.0" encoding="utf-8"?>
+<p:sld xmlns:a="http://schemas.openxmlformats.org/drawingml/2006/main" xmlns:r="http://schemas.openxmlformats.org/officeDocument/2006/relationships" xmlns:p="http://schemas.openxmlformats.org/presentationml/2006/main">
+  <p:cSld>
+    <p:spTree>
+      <p:nvGrpSpPr>
+        <p:cNvPr id="1" name=""/>
+        <p:cNvGrpSpPr/>
+        <p:nvPr/>
+      </p:nvGrpSpPr>
+      <p:grpSpPr>
+        <a:xfrm>
+          <a:off x="0" y="0"/>
+          <a:ext cx="0" cy="0"/>
+          <a:chOff x="0" y="0"/>
+          <a:chExt cx="0" cy="0"/>
+        </a:xfrm>
+      </p:grpSpPr>
+      <p:sp>
+        <p:nvSpPr>
+          <p:cNvPr id="7" name="Rectangle 6"/>
+          <p:cNvSpPr/>
+          <p:nvPr/>
+        </p:nvSpPr>
+        <p:spPr>
+          <a:xfrm>
+            <a:off x="2971800" y="2429608"/>
+            <a:ext cx="2209800" cy="3056792"/>
+          </a:xfrm>
+          <a:prstGeom prst="rect">
+            <a:avLst/>
+          </a:prstGeom>
+          <a:solidFill>
+            <a:schemeClr val="accent2">
+              <a:lumMod val="40000"/>
+              <a:lumOff val="60000"/>
+            </a:schemeClr>
+          </a:solidFill>
+        </p:spPr>
+        <p:style>
+          <a:lnRef idx="2">
+            <a:schemeClr val="accent1">
+              <a:shade val="50000"/>
+            </a:schemeClr>
+          </a:lnRef>
+          <a:fillRef idx="1">
+            <a:schemeClr val="accent1"/>
+          </a:fillRef>
+          <a:effectRef idx="0">
+            <a:schemeClr val="accent1"/>
+          </a:effectRef>
+          <a:fontRef idx="minor">
+            <a:schemeClr val="lt1"/>
+          </a:fontRef>
+        </p:style>
+        <p:txBody>
+          <a:bodyPr rtlCol="0" anchor="ctr"/>
+          <a:lstStyle/>
+          <a:p>
+            <a:pPr algn="ctr"/>
+            <a:endParaRPr lang="en-US" dirty="0"/>
+          </a:p>
+        </p:txBody>
+      </p:sp>
+      <p:sp>
+        <p:nvSpPr>
+          <p:cNvPr id="2" name="Title 1"/>
+          <p:cNvSpPr>
+            <a:spLocks noGrp="1"/>
+          </p:cNvSpPr>
+          <p:nvPr>
+            <p:ph type="title"/>
+          </p:nvPr>
+        </p:nvSpPr>
+        <p:spPr>
+          <a:xfrm>
+            <a:off x="457200" y="-76200"/>
+            <a:ext cx="8229600" cy="1143000"/>
+          </a:xfrm>
+        </p:spPr>
+        <p:txBody>
+          <a:bodyPr/>
+          <a:lstStyle/>
+          <a:p>
+            <a:r>
+              <a:rPr lang="en-US" dirty="0" smtClean="0"/>
+              <a:t>Structured wiki</a:t>
+            </a:r>
+            <a:endParaRPr lang="en-US" dirty="0"/>
+          </a:p>
+        </p:txBody>
+      </p:sp>
+      <p:sp>
+        <p:nvSpPr>
+          <p:cNvPr id="4" name="Rectangle 3"/>
+          <p:cNvSpPr/>
+          <p:nvPr/>
+        </p:nvSpPr>
+        <p:spPr>
+          <a:xfrm>
+            <a:off x="533400" y="3505200"/>
+            <a:ext cx="1828800" cy="533400"/>
+          </a:xfrm>
+          <a:prstGeom prst="rect">
+            <a:avLst/>
+          </a:prstGeom>
+        </p:spPr>
+        <p:style>
+          <a:lnRef idx="2">
+            <a:schemeClr val="accent1">
+              <a:shade val="50000"/>
+            </a:schemeClr>
+          </a:lnRef>
+          <a:fillRef idx="1">
+            <a:schemeClr val="accent1"/>
+          </a:fillRef>
+          <a:effectRef idx="0">
+            <a:schemeClr val="accent1"/>
+          </a:effectRef>
+          <a:fontRef idx="minor">
+            <a:schemeClr val="lt1"/>
+          </a:fontRef>
+        </p:style>
+        <p:txBody>
+          <a:bodyPr rtlCol="0" anchor="ctr"/>
+          <a:lstStyle/>
+          <a:p>
+            <a:pPr algn="ctr"/>
+            <a:r>
+              <a:rPr lang="en-US" dirty="0" smtClean="0"/>
+              <a:t>NGS analysis</a:t>
+            </a:r>
+            <a:endParaRPr lang="en-US" dirty="0"/>
+          </a:p>
+        </p:txBody>
+      </p:sp>
+      <p:sp>
+        <p:nvSpPr>
+          <p:cNvPr id="5" name="Rectangle 4"/>
+          <p:cNvSpPr/>
+          <p:nvPr/>
+        </p:nvSpPr>
+        <p:spPr>
+          <a:xfrm>
+            <a:off x="3200400" y="1828800"/>
+            <a:ext cx="1828800" cy="533400"/>
+          </a:xfrm>
+          <a:prstGeom prst="rect">
+            <a:avLst/>
+          </a:prstGeom>
+        </p:spPr>
+        <p:style>
+          <a:lnRef idx="2">
+            <a:schemeClr val="accent1">
+              <a:shade val="50000"/>
+            </a:schemeClr>
+          </a:lnRef>
+          <a:fillRef idx="1">
+            <a:schemeClr val="accent1"/>
+          </a:fillRef>
+          <a:effectRef idx="0">
+            <a:schemeClr val="accent1"/>
+          </a:effectRef>
+          <a:fontRef idx="minor">
+            <a:schemeClr val="lt1"/>
+          </a:fontRef>
+        </p:style>
+        <p:txBody>
+          <a:bodyPr rtlCol="0" anchor="ctr"/>
+          <a:lstStyle/>
+          <a:p>
+            <a:pPr algn="ctr"/>
+            <a:r>
+              <a:rPr lang="en-US" dirty="0" smtClean="0"/>
+              <a:t>Alignment</a:t>
+            </a:r>
+            <a:endParaRPr lang="en-US" dirty="0"/>
+          </a:p>
+        </p:txBody>
+      </p:sp>
+      <p:sp>
+        <p:nvSpPr>
+          <p:cNvPr id="6" name="Rectangle 5"/>
+          <p:cNvSpPr/>
+          <p:nvPr/>
+        </p:nvSpPr>
+        <p:spPr>
+          <a:xfrm>
+            <a:off x="3200400" y="2667000"/>
+            <a:ext cx="1828800" cy="533400"/>
+          </a:xfrm>
+          <a:prstGeom prst="rect">
+            <a:avLst/>
+          </a:prstGeom>
+        </p:spPr>
+        <p:style>
+          <a:lnRef idx="2">
+            <a:schemeClr val="accent1">
+              <a:shade val="50000"/>
+            </a:schemeClr>
+          </a:lnRef>
+          <a:fillRef idx="1">
+            <a:schemeClr val="accent1"/>
+          </a:fillRef>
+          <a:effectRef idx="0">
+            <a:schemeClr val="accent1"/>
+          </a:effectRef>
+          <a:fontRef idx="minor">
+            <a:schemeClr val="lt1"/>
+          </a:fontRef>
+        </p:style>
+        <p:txBody>
+          <a:bodyPr rtlCol="0" anchor="ctr"/>
+          <a:lstStyle/>
+          <a:p>
+            <a:pPr algn="ctr"/>
+            <a:r>
+              <a:rPr lang="en-US" dirty="0" err="1" smtClean="0"/>
+              <a:t>ChIP-Seq</a:t>
+            </a:r>
+            <a:endParaRPr lang="en-US" dirty="0"/>
+          </a:p>
+        </p:txBody>
+      </p:sp>
+      <p:sp>
+        <p:nvSpPr>
+          <p:cNvPr id="8" name="Rectangle 7"/>
+          <p:cNvSpPr/>
+          <p:nvPr/>
+        </p:nvSpPr>
+        <p:spPr>
+          <a:xfrm>
+            <a:off x="3200400" y="3352800"/>
+            <a:ext cx="1828800" cy="533400"/>
+          </a:xfrm>
+          <a:prstGeom prst="rect">
+            <a:avLst/>
+          </a:prstGeom>
+        </p:spPr>
+        <p:style>
+          <a:lnRef idx="2">
+            <a:schemeClr val="accent1">
+              <a:shade val="50000"/>
+            </a:schemeClr>
+          </a:lnRef>
+          <a:fillRef idx="1">
+            <a:schemeClr val="accent1"/>
+          </a:fillRef>
+          <a:effectRef idx="0">
+            <a:schemeClr val="accent1"/>
+          </a:effectRef>
+          <a:fontRef idx="minor">
+            <a:schemeClr val="lt1"/>
+          </a:fontRef>
+        </p:style>
+        <p:txBody>
+          <a:bodyPr rtlCol="0" anchor="ctr"/>
+          <a:lstStyle/>
+          <a:p>
+            <a:pPr algn="ctr"/>
+            <a:r>
+              <a:rPr lang="en-US" dirty="0" smtClean="0"/>
+              <a:t>RNA-</a:t>
+            </a:r>
+            <a:r>
+              <a:rPr lang="en-US" dirty="0" err="1" smtClean="0"/>
+              <a:t>Seq</a:t>
+            </a:r>
+            <a:endParaRPr lang="en-US" dirty="0"/>
+          </a:p>
+        </p:txBody>
+      </p:sp>
+      <p:sp>
+        <p:nvSpPr>
+          <p:cNvPr id="9" name="Rectangle 8"/>
+          <p:cNvSpPr/>
+          <p:nvPr/>
+        </p:nvSpPr>
+        <p:spPr>
+          <a:xfrm>
+            <a:off x="3200400" y="4038600"/>
+            <a:ext cx="1828800" cy="533400"/>
+          </a:xfrm>
+          <a:prstGeom prst="rect">
+            <a:avLst/>
+          </a:prstGeom>
+        </p:spPr>
+        <p:style>
+          <a:lnRef idx="2">
+            <a:schemeClr val="accent1">
+              <a:shade val="50000"/>
+            </a:schemeClr>
+          </a:lnRef>
+          <a:fillRef idx="1">
+            <a:schemeClr val="accent1"/>
+          </a:fillRef>
+          <a:effectRef idx="0">
+            <a:schemeClr val="accent1"/>
+          </a:effectRef>
+          <a:fontRef idx="minor">
+            <a:schemeClr val="lt1"/>
+          </a:fontRef>
+        </p:style>
+        <p:txBody>
+          <a:bodyPr rtlCol="0" anchor="ctr"/>
+          <a:lstStyle/>
+          <a:p>
+            <a:pPr algn="ctr"/>
+            <a:r>
+              <a:rPr lang="en-US" dirty="0" smtClean="0"/>
+              <a:t>Variant calling</a:t>
+            </a:r>
+            <a:endParaRPr lang="en-US" dirty="0"/>
+          </a:p>
+        </p:txBody>
+      </p:sp>
+      <p:sp>
+        <p:nvSpPr>
+          <p:cNvPr id="10" name="Rectangle 9"/>
+          <p:cNvSpPr/>
+          <p:nvPr/>
+        </p:nvSpPr>
+        <p:spPr>
+          <a:xfrm>
+            <a:off x="3200400" y="4724400"/>
+            <a:ext cx="1828800" cy="533400"/>
+          </a:xfrm>
+          <a:prstGeom prst="rect">
+            <a:avLst/>
+          </a:prstGeom>
+        </p:spPr>
+        <p:style>
+          <a:lnRef idx="2">
+            <a:schemeClr val="accent1">
+              <a:shade val="50000"/>
+            </a:schemeClr>
+          </a:lnRef>
+          <a:fillRef idx="1">
+            <a:schemeClr val="accent1"/>
+          </a:fillRef>
+          <a:effectRef idx="0">
+            <a:schemeClr val="accent1"/>
+          </a:effectRef>
+          <a:fontRef idx="minor">
+            <a:schemeClr val="lt1"/>
+          </a:fontRef>
+        </p:style>
+        <p:txBody>
+          <a:bodyPr rtlCol="0" anchor="ctr"/>
+          <a:lstStyle/>
+          <a:p>
+            <a:pPr algn="ctr"/>
+            <a:r>
+              <a:rPr lang="en-US" dirty="0" smtClean="0"/>
+              <a:t>…</a:t>
+            </a:r>
+            <a:endParaRPr lang="en-US" dirty="0"/>
+          </a:p>
+        </p:txBody>
+      </p:sp>
+      <p:sp>
+        <p:nvSpPr>
+          <p:cNvPr id="12" name="Left Brace 11"/>
+          <p:cNvSpPr/>
+          <p:nvPr/>
+        </p:nvSpPr>
+        <p:spPr>
+          <a:xfrm>
+            <a:off x="2438400" y="1409700"/>
+            <a:ext cx="457200" cy="4991100"/>
+          </a:xfrm>
+          <a:prstGeom prst="leftBrace">
+            <a:avLst/>
+          </a:prstGeom>
+        </p:spPr>
+        <p:style>
+          <a:lnRef idx="1">
+            <a:schemeClr val="accent1"/>
+          </a:lnRef>
+          <a:fillRef idx="0">
+            <a:schemeClr val="accent1"/>
+          </a:fillRef>
+          <a:effectRef idx="0">
+            <a:schemeClr val="accent1"/>
+          </a:effectRef>
+          <a:fontRef idx="minor">
+            <a:schemeClr val="tx1"/>
+          </a:fontRef>
+        </p:style>
+        <p:txBody>
+          <a:bodyPr rtlCol="0" anchor="ctr"/>
+          <a:lstStyle/>
+          <a:p>
+            <a:pPr algn="ctr"/>
+            <a:endParaRPr lang="en-US"/>
+          </a:p>
+        </p:txBody>
+      </p:sp>
+      <p:sp>
+        <p:nvSpPr>
+          <p:cNvPr id="13" name="Left Brace 12"/>
+          <p:cNvSpPr/>
+          <p:nvPr/>
+        </p:nvSpPr>
+        <p:spPr>
+          <a:xfrm>
+            <a:off x="5105400" y="1562100"/>
+            <a:ext cx="457200" cy="2705100"/>
+          </a:xfrm>
+          <a:prstGeom prst="leftBrace">
+            <a:avLst/>
+          </a:prstGeom>
+        </p:spPr>
+        <p:style>
+          <a:lnRef idx="1">
+            <a:schemeClr val="accent1"/>
+          </a:lnRef>
+          <a:fillRef idx="0">
+            <a:schemeClr val="accent1"/>
+          </a:fillRef>
+          <a:effectRef idx="0">
+            <a:schemeClr val="accent1"/>
+          </a:effectRef>
+          <a:fontRef idx="minor">
+            <a:schemeClr val="tx1"/>
+          </a:fontRef>
+        </p:style>
+        <p:txBody>
+          <a:bodyPr rtlCol="0" anchor="ctr"/>
+          <a:lstStyle/>
+          <a:p>
+            <a:pPr algn="ctr"/>
+            <a:endParaRPr lang="en-US"/>
+          </a:p>
+        </p:txBody>
+      </p:sp>
+      <p:sp>
+        <p:nvSpPr>
+          <p:cNvPr id="15" name="Rectangle 14"/>
+          <p:cNvSpPr/>
+          <p:nvPr/>
+        </p:nvSpPr>
+        <p:spPr>
+          <a:xfrm>
+            <a:off x="5715000" y="1295400"/>
+            <a:ext cx="1828800" cy="533400"/>
+          </a:xfrm>
+          <a:prstGeom prst="rect">
+            <a:avLst/>
+          </a:prstGeom>
+        </p:spPr>
+        <p:style>
+          <a:lnRef idx="2">
+            <a:schemeClr val="accent1">
+              <a:shade val="50000"/>
+            </a:schemeClr>
+          </a:lnRef>
+          <a:fillRef idx="1">
+            <a:schemeClr val="accent1"/>
+          </a:fillRef>
+          <a:effectRef idx="0">
+            <a:schemeClr val="accent1"/>
+          </a:effectRef>
+          <a:fontRef idx="minor">
+            <a:schemeClr val="lt1"/>
+          </a:fontRef>
+        </p:style>
+        <p:txBody>
+          <a:bodyPr rtlCol="0" anchor="ctr"/>
+          <a:lstStyle/>
+          <a:p>
+            <a:pPr algn="ctr"/>
+            <a:r>
+              <a:rPr lang="en-US" dirty="0" smtClean="0"/>
+              <a:t>Shift size estimation</a:t>
+            </a:r>
+            <a:endParaRPr lang="en-US" dirty="0"/>
+          </a:p>
+        </p:txBody>
+      </p:sp>
+      <p:sp>
+        <p:nvSpPr>
+          <p:cNvPr id="16" name="Rectangle 15"/>
+          <p:cNvSpPr/>
+          <p:nvPr/>
+        </p:nvSpPr>
+        <p:spPr>
+          <a:xfrm>
+            <a:off x="5732585" y="2596662"/>
+            <a:ext cx="1828800" cy="533400"/>
+          </a:xfrm>
+          <a:prstGeom prst="rect">
+            <a:avLst/>
+          </a:prstGeom>
+        </p:spPr>
+        <p:style>
+          <a:lnRef idx="2">
+            <a:schemeClr val="accent1">
+              <a:shade val="50000"/>
+            </a:schemeClr>
+          </a:lnRef>
+          <a:fillRef idx="1">
+            <a:schemeClr val="accent1"/>
+          </a:fillRef>
+          <a:effectRef idx="0">
+            <a:schemeClr val="accent1"/>
+          </a:effectRef>
+          <a:fontRef idx="minor">
+            <a:schemeClr val="lt1"/>
+          </a:fontRef>
+        </p:style>
+        <p:txBody>
+          <a:bodyPr rtlCol="0" anchor="ctr"/>
+          <a:lstStyle/>
+          <a:p>
+            <a:pPr algn="ctr"/>
+            <a:r>
+              <a:rPr lang="en-US" dirty="0" smtClean="0"/>
+              <a:t>Statistical testing</a:t>
+            </a:r>
+            <a:endParaRPr lang="en-US" dirty="0"/>
+          </a:p>
+        </p:txBody>
+      </p:sp>
+      <p:sp>
+        <p:nvSpPr>
+          <p:cNvPr id="17" name="Rectangle 16"/>
+          <p:cNvSpPr/>
+          <p:nvPr/>
+        </p:nvSpPr>
+        <p:spPr>
+          <a:xfrm>
+            <a:off x="5732585" y="3358662"/>
+            <a:ext cx="1828800" cy="533400"/>
+          </a:xfrm>
+          <a:prstGeom prst="rect">
+            <a:avLst/>
+          </a:prstGeom>
+        </p:spPr>
+        <p:style>
+          <a:lnRef idx="2">
+            <a:schemeClr val="accent1">
+              <a:shade val="50000"/>
+            </a:schemeClr>
+          </a:lnRef>
+          <a:fillRef idx="1">
+            <a:schemeClr val="accent1"/>
+          </a:fillRef>
+          <a:effectRef idx="0">
+            <a:schemeClr val="accent1"/>
+          </a:effectRef>
+          <a:fontRef idx="minor">
+            <a:schemeClr val="lt1"/>
+          </a:fontRef>
+        </p:style>
+        <p:txBody>
+          <a:bodyPr rtlCol="0" anchor="ctr"/>
+          <a:lstStyle/>
+          <a:p>
+            <a:pPr algn="ctr"/>
+            <a:r>
+              <a:rPr lang="en-US" dirty="0" smtClean="0"/>
+              <a:t>Post-processing</a:t>
+            </a:r>
+            <a:endParaRPr lang="en-US" dirty="0"/>
+          </a:p>
+        </p:txBody>
+      </p:sp>
+      <p:sp>
+        <p:nvSpPr>
+          <p:cNvPr id="18" name="Rectangle 17"/>
+          <p:cNvSpPr/>
+          <p:nvPr/>
+        </p:nvSpPr>
+        <p:spPr>
+          <a:xfrm>
+            <a:off x="5715000" y="1913792"/>
+            <a:ext cx="1828800" cy="533400"/>
+          </a:xfrm>
+          <a:prstGeom prst="rect">
+            <a:avLst/>
+          </a:prstGeom>
+        </p:spPr>
+        <p:style>
+          <a:lnRef idx="2">
+            <a:schemeClr val="accent1">
+              <a:shade val="50000"/>
+            </a:schemeClr>
+          </a:lnRef>
+          <a:fillRef idx="1">
+            <a:schemeClr val="accent1"/>
+          </a:fillRef>
+          <a:effectRef idx="0">
+            <a:schemeClr val="accent1"/>
+          </a:effectRef>
+          <a:fontRef idx="minor">
+            <a:schemeClr val="lt1"/>
+          </a:fontRef>
+        </p:style>
+        <p:txBody>
+          <a:bodyPr rtlCol="0" anchor="ctr"/>
+          <a:lstStyle/>
+          <a:p>
+            <a:pPr algn="ctr"/>
+            <a:r>
+              <a:rPr lang="en-US" dirty="0" smtClean="0"/>
+              <a:t>Normalization</a:t>
+            </a:r>
+            <a:endParaRPr lang="en-US" dirty="0"/>
+          </a:p>
+        </p:txBody>
+      </p:sp>
+      <p:sp>
+        <p:nvSpPr>
+          <p:cNvPr id="19" name="Rectangle 18"/>
+          <p:cNvSpPr/>
+          <p:nvPr/>
+        </p:nvSpPr>
+        <p:spPr>
+          <a:xfrm>
+            <a:off x="5756031" y="4070839"/>
+            <a:ext cx="1828800" cy="533400"/>
+          </a:xfrm>
+          <a:prstGeom prst="rect">
+            <a:avLst/>
+          </a:prstGeom>
+        </p:spPr>
+        <p:style>
+          <a:lnRef idx="2">
+            <a:schemeClr val="accent1">
+              <a:shade val="50000"/>
+            </a:schemeClr>
+          </a:lnRef>
+          <a:fillRef idx="1">
+            <a:schemeClr val="accent1"/>
+          </a:fillRef>
+          <a:effectRef idx="0">
+            <a:schemeClr val="accent1"/>
+          </a:effectRef>
+          <a:fontRef idx="minor">
+            <a:schemeClr val="lt1"/>
+          </a:fontRef>
+        </p:style>
+        <p:txBody>
+          <a:bodyPr rtlCol="0" anchor="ctr"/>
+          <a:lstStyle/>
+          <a:p>
+            <a:pPr algn="ctr"/>
+            <a:r>
+              <a:rPr lang="en-US" dirty="0" smtClean="0"/>
+              <a:t>Blacklisted regions</a:t>
+            </a:r>
+            <a:endParaRPr lang="en-US" dirty="0"/>
+          </a:p>
+        </p:txBody>
+      </p:sp>
+      <p:sp>
+        <p:nvSpPr>
+          <p:cNvPr id="20" name="Rectangle 19"/>
+          <p:cNvSpPr/>
+          <p:nvPr/>
+        </p:nvSpPr>
+        <p:spPr>
+          <a:xfrm>
+            <a:off x="3200400" y="5638800"/>
+            <a:ext cx="1828800" cy="533400"/>
+          </a:xfrm>
+          <a:prstGeom prst="rect">
+            <a:avLst/>
+          </a:prstGeom>
+        </p:spPr>
+        <p:style>
+          <a:lnRef idx="2">
+            <a:schemeClr val="accent1">
+              <a:shade val="50000"/>
+            </a:schemeClr>
+          </a:lnRef>
+          <a:fillRef idx="1">
+            <a:schemeClr val="accent1"/>
+          </a:fillRef>
+          <a:effectRef idx="0">
+            <a:schemeClr val="accent1"/>
+          </a:effectRef>
+          <a:fontRef idx="minor">
+            <a:schemeClr val="lt1"/>
+          </a:fontRef>
+        </p:style>
+        <p:txBody>
+          <a:bodyPr rtlCol="0" anchor="ctr"/>
+          <a:lstStyle/>
+          <a:p>
+            <a:pPr algn="ctr"/>
+            <a:r>
+              <a:rPr lang="en-US" dirty="0" smtClean="0"/>
+              <a:t>Enrichment testing</a:t>
+            </a:r>
+            <a:endParaRPr lang="en-US" dirty="0"/>
+          </a:p>
+        </p:txBody>
+      </p:sp>
+      <p:sp>
+        <p:nvSpPr>
+          <p:cNvPr id="22" name="Rectangle 21"/>
+          <p:cNvSpPr/>
+          <p:nvPr/>
+        </p:nvSpPr>
+        <p:spPr>
+          <a:xfrm>
+            <a:off x="3200400" y="1143000"/>
+            <a:ext cx="1828800" cy="533400"/>
+          </a:xfrm>
+          <a:prstGeom prst="rect">
+            <a:avLst/>
+          </a:prstGeom>
+        </p:spPr>
+        <p:style>
+          <a:lnRef idx="2">
+            <a:schemeClr val="accent1">
+              <a:shade val="50000"/>
+            </a:schemeClr>
+          </a:lnRef>
+          <a:fillRef idx="1">
+            <a:schemeClr val="accent1"/>
+          </a:fillRef>
+          <a:effectRef idx="0">
+            <a:schemeClr val="accent1"/>
+          </a:effectRef>
+          <a:fontRef idx="minor">
+            <a:schemeClr val="lt1"/>
+          </a:fontRef>
+        </p:style>
+        <p:txBody>
+          <a:bodyPr rtlCol="0" anchor="ctr"/>
+          <a:lstStyle/>
+          <a:p>
+            <a:pPr algn="ctr"/>
+            <a:r>
+              <a:rPr lang="en-US" dirty="0" smtClean="0"/>
+              <a:t>QC checks</a:t>
+            </a:r>
+            <a:endParaRPr lang="en-US" dirty="0"/>
+          </a:p>
+        </p:txBody>
+      </p:sp>
+      <p:sp>
+        <p:nvSpPr>
+          <p:cNvPr id="23" name="Rectangle 22"/>
+          <p:cNvSpPr/>
+          <p:nvPr/>
+        </p:nvSpPr>
+        <p:spPr>
+          <a:xfrm>
+            <a:off x="3200400" y="6301154"/>
+            <a:ext cx="1828800" cy="533400"/>
+          </a:xfrm>
+          <a:prstGeom prst="rect">
+            <a:avLst/>
+          </a:prstGeom>
+        </p:spPr>
+        <p:style>
+          <a:lnRef idx="2">
+            <a:schemeClr val="accent1">
+              <a:shade val="50000"/>
+            </a:schemeClr>
+          </a:lnRef>
+          <a:fillRef idx="1">
+            <a:schemeClr val="accent1"/>
+          </a:fillRef>
+          <a:effectRef idx="0">
+            <a:schemeClr val="accent1"/>
+          </a:effectRef>
+          <a:fontRef idx="minor">
+            <a:schemeClr val="lt1"/>
+          </a:fontRef>
+        </p:style>
+        <p:txBody>
+          <a:bodyPr rtlCol="0" anchor="ctr"/>
+          <a:lstStyle/>
+          <a:p>
+            <a:pPr algn="ctr"/>
+            <a:r>
+              <a:rPr lang="en-US" dirty="0" smtClean="0"/>
+              <a:t>Access to public data repository</a:t>
+            </a:r>
+            <a:endParaRPr lang="en-US" dirty="0"/>
+          </a:p>
+        </p:txBody>
+      </p:sp>
+    </p:spTree>
+    <p:extLst>
+      <p:ext uri="{BB962C8B-B14F-4D97-AF65-F5344CB8AC3E}">
+        <p14:creationId xmlns:p14="http://schemas.microsoft.com/office/powerpoint/2010/main" val="1489236265"/>
+      </p:ext>
+    </p:extLst>
+  </p:cSld>
+  <p:clrMapOvr>
+    <a:masterClrMapping/>
+  </p:clrMapOvr>
+  <p:timing>
+    <p:tnLst>
+      <p:par>
+        <p:cTn id="1" dur="indefinite" restart="never" nodeType="tmRoot"/>
+      </p:par>
+    </p:tnLst>
+  </p:timing>
+</p:sld>
+</file>
+
+<file path=ppt/slides/slide12.xml><?xml version="1.0" encoding="utf-8"?>
 <p:sld xmlns:a="http://schemas.openxmlformats.org/drawingml/2006/main" xmlns:r="http://schemas.openxmlformats.org/officeDocument/2006/relationships" xmlns:p="http://schemas.openxmlformats.org/presentationml/2006/main">
   <p:cSld>
     <p:spTree>
@@ -3595,7 +4478,7 @@
 </p:sld>
 </file>
 
-<file path=ppt/slides/slide11.xml><?xml version="1.0" encoding="utf-8"?>
+<file path=ppt/slides/slide13.xml><?xml version="1.0" encoding="utf-8"?>
 <p:sld xmlns:a="http://schemas.openxmlformats.org/drawingml/2006/main" xmlns:r="http://schemas.openxmlformats.org/officeDocument/2006/relationships" xmlns:p="http://schemas.openxmlformats.org/presentationml/2006/main">
   <p:cSld>
     <p:spTree>
@@ -3782,7 +4665,7 @@
 </p:sld>
 </file>
 
-<file path=ppt/slides/slide12.xml><?xml version="1.0" encoding="utf-8"?>
+<file path=ppt/slides/slide14.xml><?xml version="1.0" encoding="utf-8"?>
 <p:sld xmlns:a="http://schemas.openxmlformats.org/drawingml/2006/main" xmlns:r="http://schemas.openxmlformats.org/officeDocument/2006/relationships" xmlns:p="http://schemas.openxmlformats.org/presentationml/2006/main">
   <p:cSld>
     <p:spTree>
@@ -3904,7 +4787,7 @@
 </p:sld>
 </file>
 
-<file path=ppt/slides/slide13.xml><?xml version="1.0" encoding="utf-8"?>
+<file path=ppt/slides/slide15.xml><?xml version="1.0" encoding="utf-8"?>
 <p:sld xmlns:a="http://schemas.openxmlformats.org/drawingml/2006/main" xmlns:r="http://schemas.openxmlformats.org/officeDocument/2006/relationships" xmlns:p="http://schemas.openxmlformats.org/presentationml/2006/main">
   <p:cSld>
     <p:spTree>
@@ -3998,7 +4881,7 @@
 </p:sld>
 </file>
 
-<file path=ppt/slides/slide14.xml><?xml version="1.0" encoding="utf-8"?>
+<file path=ppt/slides/slide16.xml><?xml version="1.0" encoding="utf-8"?>
 <p:sld xmlns:a="http://schemas.openxmlformats.org/drawingml/2006/main" xmlns:r="http://schemas.openxmlformats.org/officeDocument/2006/relationships" xmlns:p="http://schemas.openxmlformats.org/presentationml/2006/main">
   <p:cSld>
     <p:spTree>
@@ -4553,7 +5436,132 @@
 </p:sld>
 </file>
 
-<file path=ppt/slides/slide15.xml><?xml version="1.0" encoding="utf-8"?>
+<file path=ppt/slides/slide17.xml><?xml version="1.0" encoding="utf-8"?>
+<p:sld xmlns:a="http://schemas.openxmlformats.org/drawingml/2006/main" xmlns:r="http://schemas.openxmlformats.org/officeDocument/2006/relationships" xmlns:p="http://schemas.openxmlformats.org/presentationml/2006/main">
+  <p:cSld>
+    <p:spTree>
+      <p:nvGrpSpPr>
+        <p:cNvPr id="1" name=""/>
+        <p:cNvGrpSpPr/>
+        <p:nvPr/>
+      </p:nvGrpSpPr>
+      <p:grpSpPr>
+        <a:xfrm>
+          <a:off x="0" y="0"/>
+          <a:ext cx="0" cy="0"/>
+          <a:chOff x="0" y="0"/>
+          <a:chExt cx="0" cy="0"/>
+        </a:xfrm>
+      </p:grpSpPr>
+      <p:sp>
+        <p:nvSpPr>
+          <p:cNvPr id="2" name="Title 1"/>
+          <p:cNvSpPr>
+            <a:spLocks noGrp="1"/>
+          </p:cNvSpPr>
+          <p:nvPr>
+            <p:ph type="title"/>
+          </p:nvPr>
+        </p:nvSpPr>
+        <p:spPr/>
+        <p:txBody>
+          <a:bodyPr/>
+          <a:lstStyle/>
+          <a:p>
+            <a:r>
+              <a:rPr lang="en-US" dirty="0" smtClean="0"/>
+              <a:t>Main page</a:t>
+            </a:r>
+            <a:endParaRPr lang="en-US" dirty="0"/>
+          </a:p>
+        </p:txBody>
+      </p:sp>
+    </p:spTree>
+    <p:extLst>
+      <p:ext uri="{BB962C8B-B14F-4D97-AF65-F5344CB8AC3E}">
+        <p14:creationId xmlns:p14="http://schemas.microsoft.com/office/powerpoint/2010/main" val="3628385846"/>
+      </p:ext>
+    </p:extLst>
+  </p:cSld>
+  <p:clrMapOvr>
+    <a:masterClrMapping/>
+  </p:clrMapOvr>
+</p:sld>
+</file>
+
+<file path=ppt/slides/slide18.xml><?xml version="1.0" encoding="utf-8"?>
+<p:sld xmlns:a="http://schemas.openxmlformats.org/drawingml/2006/main" xmlns:r="http://schemas.openxmlformats.org/officeDocument/2006/relationships" xmlns:p="http://schemas.openxmlformats.org/presentationml/2006/main">
+  <p:cSld>
+    <p:spTree>
+      <p:nvGrpSpPr>
+        <p:cNvPr id="1" name=""/>
+        <p:cNvGrpSpPr/>
+        <p:nvPr/>
+      </p:nvGrpSpPr>
+      <p:grpSpPr>
+        <a:xfrm>
+          <a:off x="0" y="0"/>
+          <a:ext cx="0" cy="0"/>
+          <a:chOff x="0" y="0"/>
+          <a:chExt cx="0" cy="0"/>
+        </a:xfrm>
+      </p:grpSpPr>
+      <p:sp>
+        <p:nvSpPr>
+          <p:cNvPr id="2" name="Title 1"/>
+          <p:cNvSpPr>
+            <a:spLocks noGrp="1"/>
+          </p:cNvSpPr>
+          <p:nvPr>
+            <p:ph type="title"/>
+          </p:nvPr>
+        </p:nvSpPr>
+        <p:spPr/>
+        <p:txBody>
+          <a:bodyPr/>
+          <a:lstStyle/>
+          <a:p>
+            <a:r>
+              <a:rPr lang="en-US" dirty="0" smtClean="0"/>
+              <a:t>Draft specific aims</a:t>
+            </a:r>
+            <a:endParaRPr lang="en-US" dirty="0"/>
+          </a:p>
+        </p:txBody>
+      </p:sp>
+      <p:sp>
+        <p:nvSpPr>
+          <p:cNvPr id="3" name="Content Placeholder 2"/>
+          <p:cNvSpPr>
+            <a:spLocks noGrp="1"/>
+          </p:cNvSpPr>
+          <p:nvPr>
+            <p:ph idx="1"/>
+          </p:nvPr>
+        </p:nvSpPr>
+        <p:spPr/>
+        <p:txBody>
+          <a:bodyPr/>
+          <a:lstStyle/>
+          <a:p>
+            <a:endParaRPr lang="en-US"/>
+          </a:p>
+        </p:txBody>
+      </p:sp>
+    </p:spTree>
+    <p:extLst>
+      <p:ext uri="{BB962C8B-B14F-4D97-AF65-F5344CB8AC3E}">
+        <p14:creationId xmlns:p14="http://schemas.microsoft.com/office/powerpoint/2010/main" val="2535276682"/>
+      </p:ext>
+    </p:extLst>
+  </p:cSld>
+  <p:clrMapOvr>
+    <a:masterClrMapping/>
+  </p:clrMapOvr>
+</p:sld>
+</file>
+
+<file path=ppt/slides/slide19.xml><?xml version="1.0" encoding="utf-8"?>
 <p:sld xmlns:a="http://schemas.openxmlformats.org/drawingml/2006/main" xmlns:r="http://schemas.openxmlformats.org/officeDocument/2006/relationships" xmlns:p="http://schemas.openxmlformats.org/presentationml/2006/main" show="0">
   <p:cSld>
     <p:spTree>
@@ -5739,156 +6747,6 @@
 </p:sld>
 </file>
 
-<file path=ppt/slides/slide16.xml><?xml version="1.0" encoding="utf-8"?>
-<p:sld xmlns:a="http://schemas.openxmlformats.org/drawingml/2006/main" xmlns:r="http://schemas.openxmlformats.org/officeDocument/2006/relationships" xmlns:p="http://schemas.openxmlformats.org/presentationml/2006/main">
-  <p:cSld>
-    <p:spTree>
-      <p:nvGrpSpPr>
-        <p:cNvPr id="1" name=""/>
-        <p:cNvGrpSpPr/>
-        <p:nvPr/>
-      </p:nvGrpSpPr>
-      <p:grpSpPr>
-        <a:xfrm>
-          <a:off x="0" y="0"/>
-          <a:ext cx="0" cy="0"/>
-          <a:chOff x="0" y="0"/>
-          <a:chExt cx="0" cy="0"/>
-        </a:xfrm>
-      </p:grpSpPr>
-      <p:sp>
-        <p:nvSpPr>
-          <p:cNvPr id="2" name="Title 1"/>
-          <p:cNvSpPr>
-            <a:spLocks noGrp="1"/>
-          </p:cNvSpPr>
-          <p:nvPr>
-            <p:ph type="title"/>
-          </p:nvPr>
-        </p:nvSpPr>
-        <p:spPr/>
-        <p:txBody>
-          <a:bodyPr/>
-          <a:lstStyle/>
-          <a:p>
-            <a:r>
-              <a:rPr lang="en-US" dirty="0" smtClean="0"/>
-              <a:t>User Stories</a:t>
-            </a:r>
-            <a:endParaRPr lang="en-US" dirty="0"/>
-          </a:p>
-        </p:txBody>
-      </p:sp>
-      <p:sp>
-        <p:nvSpPr>
-          <p:cNvPr id="3" name="Content Placeholder 2"/>
-          <p:cNvSpPr>
-            <a:spLocks noGrp="1"/>
-          </p:cNvSpPr>
-          <p:nvPr>
-            <p:ph idx="1"/>
-          </p:nvPr>
-        </p:nvSpPr>
-        <p:spPr/>
-        <p:txBody>
-          <a:bodyPr/>
-          <a:lstStyle/>
-          <a:p>
-            <a:r>
-              <a:rPr lang="en-US" dirty="0" smtClean="0"/>
-              <a:t>Wiki Page</a:t>
-            </a:r>
-          </a:p>
-          <a:p>
-            <a:endParaRPr lang="en-US" dirty="0"/>
-          </a:p>
-        </p:txBody>
-      </p:sp>
-    </p:spTree>
-    <p:extLst>
-      <p:ext uri="{BB962C8B-B14F-4D97-AF65-F5344CB8AC3E}">
-        <p14:creationId xmlns:p14="http://schemas.microsoft.com/office/powerpoint/2010/main" val="3229278775"/>
-      </p:ext>
-    </p:extLst>
-  </p:cSld>
-  <p:clrMapOvr>
-    <a:masterClrMapping/>
-  </p:clrMapOvr>
-</p:sld>
-</file>
-
-<file path=ppt/slides/slide17.xml><?xml version="1.0" encoding="utf-8"?>
-<p:sld xmlns:a="http://schemas.openxmlformats.org/drawingml/2006/main" xmlns:r="http://schemas.openxmlformats.org/officeDocument/2006/relationships" xmlns:p="http://schemas.openxmlformats.org/presentationml/2006/main">
-  <p:cSld>
-    <p:spTree>
-      <p:nvGrpSpPr>
-        <p:cNvPr id="1" name=""/>
-        <p:cNvGrpSpPr/>
-        <p:nvPr/>
-      </p:nvGrpSpPr>
-      <p:grpSpPr>
-        <a:xfrm>
-          <a:off x="0" y="0"/>
-          <a:ext cx="0" cy="0"/>
-          <a:chOff x="0" y="0"/>
-          <a:chExt cx="0" cy="0"/>
-        </a:xfrm>
-      </p:grpSpPr>
-      <p:sp>
-        <p:nvSpPr>
-          <p:cNvPr id="2" name="Title 1"/>
-          <p:cNvSpPr>
-            <a:spLocks noGrp="1"/>
-          </p:cNvSpPr>
-          <p:nvPr>
-            <p:ph type="title"/>
-          </p:nvPr>
-        </p:nvSpPr>
-        <p:spPr/>
-        <p:txBody>
-          <a:bodyPr/>
-          <a:lstStyle/>
-          <a:p>
-            <a:endParaRPr lang="en-US"/>
-          </a:p>
-        </p:txBody>
-      </p:sp>
-      <p:sp>
-        <p:nvSpPr>
-          <p:cNvPr id="3" name="Content Placeholder 2"/>
-          <p:cNvSpPr>
-            <a:spLocks noGrp="1"/>
-          </p:cNvSpPr>
-          <p:nvPr>
-            <p:ph idx="1"/>
-          </p:nvPr>
-        </p:nvSpPr>
-        <p:spPr/>
-        <p:txBody>
-          <a:bodyPr/>
-          <a:lstStyle/>
-          <a:p>
-            <a:r>
-              <a:rPr lang="en-US" dirty="0" smtClean="0"/>
-              <a:t>Post page</a:t>
-            </a:r>
-            <a:endParaRPr lang="en-US" dirty="0"/>
-          </a:p>
-        </p:txBody>
-      </p:sp>
-    </p:spTree>
-    <p:extLst>
-      <p:ext uri="{BB962C8B-B14F-4D97-AF65-F5344CB8AC3E}">
-        <p14:creationId xmlns:p14="http://schemas.microsoft.com/office/powerpoint/2010/main" val="1968698794"/>
-      </p:ext>
-    </p:extLst>
-  </p:cSld>
-  <p:clrMapOvr>
-    <a:masterClrMapping/>
-  </p:clrMapOvr>
-</p:sld>
-</file>
-
 <file path=ppt/slides/slide2.xml><?xml version="1.0" encoding="utf-8"?>
 <p:sld xmlns:a="http://schemas.openxmlformats.org/drawingml/2006/main" xmlns:r="http://schemas.openxmlformats.org/officeDocument/2006/relationships" xmlns:p="http://schemas.openxmlformats.org/presentationml/2006/main">
   <p:cSld>
@@ -5989,6 +6847,156 @@
     <p:extLst>
       <p:ext uri="{BB962C8B-B14F-4D97-AF65-F5344CB8AC3E}">
         <p14:creationId xmlns:p14="http://schemas.microsoft.com/office/powerpoint/2010/main" val="4027633163"/>
+      </p:ext>
+    </p:extLst>
+  </p:cSld>
+  <p:clrMapOvr>
+    <a:masterClrMapping/>
+  </p:clrMapOvr>
+</p:sld>
+</file>
+
+<file path=ppt/slides/slide20.xml><?xml version="1.0" encoding="utf-8"?>
+<p:sld xmlns:a="http://schemas.openxmlformats.org/drawingml/2006/main" xmlns:r="http://schemas.openxmlformats.org/officeDocument/2006/relationships" xmlns:p="http://schemas.openxmlformats.org/presentationml/2006/main">
+  <p:cSld>
+    <p:spTree>
+      <p:nvGrpSpPr>
+        <p:cNvPr id="1" name=""/>
+        <p:cNvGrpSpPr/>
+        <p:nvPr/>
+      </p:nvGrpSpPr>
+      <p:grpSpPr>
+        <a:xfrm>
+          <a:off x="0" y="0"/>
+          <a:ext cx="0" cy="0"/>
+          <a:chOff x="0" y="0"/>
+          <a:chExt cx="0" cy="0"/>
+        </a:xfrm>
+      </p:grpSpPr>
+      <p:sp>
+        <p:nvSpPr>
+          <p:cNvPr id="2" name="Title 1"/>
+          <p:cNvSpPr>
+            <a:spLocks noGrp="1"/>
+          </p:cNvSpPr>
+          <p:nvPr>
+            <p:ph type="title"/>
+          </p:nvPr>
+        </p:nvSpPr>
+        <p:spPr/>
+        <p:txBody>
+          <a:bodyPr/>
+          <a:lstStyle/>
+          <a:p>
+            <a:r>
+              <a:rPr lang="en-US" dirty="0" smtClean="0"/>
+              <a:t>User Stories</a:t>
+            </a:r>
+            <a:endParaRPr lang="en-US" dirty="0"/>
+          </a:p>
+        </p:txBody>
+      </p:sp>
+      <p:sp>
+        <p:nvSpPr>
+          <p:cNvPr id="3" name="Content Placeholder 2"/>
+          <p:cNvSpPr>
+            <a:spLocks noGrp="1"/>
+          </p:cNvSpPr>
+          <p:nvPr>
+            <p:ph idx="1"/>
+          </p:nvPr>
+        </p:nvSpPr>
+        <p:spPr/>
+        <p:txBody>
+          <a:bodyPr/>
+          <a:lstStyle/>
+          <a:p>
+            <a:r>
+              <a:rPr lang="en-US" dirty="0" smtClean="0"/>
+              <a:t>Wiki Page</a:t>
+            </a:r>
+          </a:p>
+          <a:p>
+            <a:endParaRPr lang="en-US" dirty="0"/>
+          </a:p>
+        </p:txBody>
+      </p:sp>
+    </p:spTree>
+    <p:extLst>
+      <p:ext uri="{BB962C8B-B14F-4D97-AF65-F5344CB8AC3E}">
+        <p14:creationId xmlns:p14="http://schemas.microsoft.com/office/powerpoint/2010/main" val="3229278775"/>
+      </p:ext>
+    </p:extLst>
+  </p:cSld>
+  <p:clrMapOvr>
+    <a:masterClrMapping/>
+  </p:clrMapOvr>
+</p:sld>
+</file>
+
+<file path=ppt/slides/slide21.xml><?xml version="1.0" encoding="utf-8"?>
+<p:sld xmlns:a="http://schemas.openxmlformats.org/drawingml/2006/main" xmlns:r="http://schemas.openxmlformats.org/officeDocument/2006/relationships" xmlns:p="http://schemas.openxmlformats.org/presentationml/2006/main">
+  <p:cSld>
+    <p:spTree>
+      <p:nvGrpSpPr>
+        <p:cNvPr id="1" name=""/>
+        <p:cNvGrpSpPr/>
+        <p:nvPr/>
+      </p:nvGrpSpPr>
+      <p:grpSpPr>
+        <a:xfrm>
+          <a:off x="0" y="0"/>
+          <a:ext cx="0" cy="0"/>
+          <a:chOff x="0" y="0"/>
+          <a:chExt cx="0" cy="0"/>
+        </a:xfrm>
+      </p:grpSpPr>
+      <p:sp>
+        <p:nvSpPr>
+          <p:cNvPr id="2" name="Title 1"/>
+          <p:cNvSpPr>
+            <a:spLocks noGrp="1"/>
+          </p:cNvSpPr>
+          <p:nvPr>
+            <p:ph type="title"/>
+          </p:nvPr>
+        </p:nvSpPr>
+        <p:spPr/>
+        <p:txBody>
+          <a:bodyPr/>
+          <a:lstStyle/>
+          <a:p>
+            <a:endParaRPr lang="en-US"/>
+          </a:p>
+        </p:txBody>
+      </p:sp>
+      <p:sp>
+        <p:nvSpPr>
+          <p:cNvPr id="3" name="Content Placeholder 2"/>
+          <p:cNvSpPr>
+            <a:spLocks noGrp="1"/>
+          </p:cNvSpPr>
+          <p:nvPr>
+            <p:ph idx="1"/>
+          </p:nvPr>
+        </p:nvSpPr>
+        <p:spPr/>
+        <p:txBody>
+          <a:bodyPr/>
+          <a:lstStyle/>
+          <a:p>
+            <a:r>
+              <a:rPr lang="en-US" dirty="0" smtClean="0"/>
+              <a:t>Post page</a:t>
+            </a:r>
+            <a:endParaRPr lang="en-US" dirty="0"/>
+          </a:p>
+        </p:txBody>
+      </p:sp>
+    </p:spTree>
+    <p:extLst>
+      <p:ext uri="{BB962C8B-B14F-4D97-AF65-F5344CB8AC3E}">
+        <p14:creationId xmlns:p14="http://schemas.microsoft.com/office/powerpoint/2010/main" val="1968698794"/>
       </p:ext>
     </p:extLst>
   </p:cSld>
@@ -6050,35 +7058,56 @@
             <p:ph idx="1"/>
           </p:nvPr>
         </p:nvSpPr>
-        <p:spPr/>
+        <p:spPr>
+          <a:xfrm>
+            <a:off x="457200" y="1600200"/>
+            <a:ext cx="8229600" cy="4724400"/>
+          </a:xfrm>
+        </p:spPr>
         <p:txBody>
           <a:bodyPr>
-            <a:normAutofit/>
+            <a:normAutofit fontScale="92500" lnSpcReduction="10000"/>
           </a:bodyPr>
           <a:lstStyle/>
           <a:p>
+            <a:pPr marL="514350" indent="-514350">
+              <a:buFont typeface="+mj-lt"/>
+              <a:buAutoNum type="arabicPeriod"/>
+            </a:pPr>
             <a:r>
               <a:rPr lang="en-US" dirty="0" smtClean="0"/>
-              <a:t>1. BIOSTARS : Q&amp;A</a:t>
-            </a:r>
-          </a:p>
-          <a:p>
+              <a:t>BIOSTARS </a:t>
+            </a:r>
+            <a:r>
+              <a:rPr lang="en-US" dirty="0" smtClean="0"/>
+              <a:t>: Q&amp;A</a:t>
+            </a:r>
+          </a:p>
+          <a:p>
+            <a:pPr marL="514350" indent="-514350">
+              <a:buFont typeface="+mj-lt"/>
+              <a:buAutoNum type="arabicPeriod"/>
+            </a:pPr>
             <a:endParaRPr lang="en-US" dirty="0" smtClean="0"/>
           </a:p>
           <a:p>
+            <a:pPr marL="514350" indent="-514350">
+              <a:buFont typeface="+mj-lt"/>
+              <a:buAutoNum type="arabicPeriod"/>
+            </a:pPr>
             <a:endParaRPr lang="en-US" dirty="0" smtClean="0"/>
           </a:p>
           <a:p>
-            <a:r>
-              <a:rPr lang="en-US" dirty="0" smtClean="0"/>
-              <a:t>2. </a:t>
-            </a:r>
+            <a:pPr marL="514350" indent="-514350">
+              <a:buFont typeface="+mj-lt"/>
+              <a:buAutoNum type="arabicPeriod"/>
+            </a:pPr>
             <a:r>
               <a:rPr lang="en-US" dirty="0" err="1" smtClean="0"/>
               <a:t>SEQanswers</a:t>
             </a:r>
             <a:r>
-              <a:rPr lang="en-US" dirty="0"/>
+              <a:rPr lang="en-US" dirty="0" smtClean="0"/>
               <a:t> </a:t>
             </a:r>
             <a:r>
@@ -6088,18 +7117,19 @@
             <a:endParaRPr lang="en-US" dirty="0"/>
           </a:p>
           <a:p>
-            <a:pPr marL="0" indent="0">
-              <a:buNone/>
+            <a:pPr marL="514350" indent="-514350">
+              <a:buFont typeface="+mj-lt"/>
+              <a:buAutoNum type="arabicPeriod"/>
             </a:pPr>
             <a:endParaRPr lang="en-US" dirty="0" smtClean="0"/>
           </a:p>
           <a:p>
+            <a:pPr marL="514350" indent="-514350">
+              <a:buFont typeface="+mj-lt"/>
+              <a:buAutoNum type="arabicPeriod"/>
+            </a:pPr>
             <a:r>
               <a:rPr lang="en-US" dirty="0" smtClean="0"/>
-              <a:t>3. </a:t>
-            </a:r>
-            <a:r>
-              <a:rPr lang="en-US" dirty="0"/>
               <a:t>NGS </a:t>
             </a:r>
             <a:r>
@@ -6108,7 +7138,42 @@
             </a:r>
             <a:r>
               <a:rPr lang="en-US" dirty="0" smtClean="0"/>
-              <a:t> : wiki book, no Q&amp;A</a:t>
+              <a:t> : wiki book, no </a:t>
+            </a:r>
+            <a:r>
+              <a:rPr lang="en-US" dirty="0" smtClean="0"/>
+              <a:t>Q&amp;A</a:t>
+            </a:r>
+          </a:p>
+          <a:p>
+            <a:pPr marL="514350" indent="-514350">
+              <a:buFont typeface="+mj-lt"/>
+              <a:buAutoNum type="arabicPeriod"/>
+            </a:pPr>
+            <a:r>
+              <a:rPr lang="en-US" dirty="0" smtClean="0"/>
+              <a:t>Bioconductor</a:t>
+            </a:r>
+          </a:p>
+          <a:p>
+            <a:pPr marL="514350" indent="-514350">
+              <a:buFont typeface="+mj-lt"/>
+              <a:buAutoNum type="arabicPeriod"/>
+            </a:pPr>
+            <a:r>
+              <a:rPr lang="en-US" dirty="0" err="1" smtClean="0"/>
+              <a:t>StackOverflow</a:t>
+            </a:r>
+            <a:endParaRPr lang="en-US" dirty="0" smtClean="0"/>
+          </a:p>
+          <a:p>
+            <a:pPr marL="514350" indent="-514350">
+              <a:buFont typeface="+mj-lt"/>
+              <a:buAutoNum type="arabicPeriod"/>
+            </a:pPr>
+            <a:r>
+              <a:rPr lang="en-US" dirty="0" err="1" smtClean="0"/>
+              <a:t>OmicTools</a:t>
             </a:r>
             <a:endParaRPr lang="en-US" dirty="0"/>
           </a:p>
@@ -6140,7 +7205,7 @@
         </p:blipFill>
         <p:spPr bwMode="auto">
           <a:xfrm>
-            <a:off x="1066800" y="5093677"/>
+            <a:off x="6858000" y="3921441"/>
             <a:ext cx="1343025" cy="1172236"/>
           </a:xfrm>
           <a:prstGeom prst="rect">
@@ -6248,7 +7313,7 @@
         </p:blipFill>
         <p:spPr bwMode="auto">
           <a:xfrm>
-            <a:off x="781783" y="4111905"/>
+            <a:off x="1066800" y="3723614"/>
             <a:ext cx="2637692" cy="395654"/>
           </a:xfrm>
           <a:prstGeom prst="rect">
@@ -6326,6 +7391,78 @@
           <a:p>
             <a:r>
               <a:rPr lang="en-US" dirty="0" smtClean="0"/>
+              <a:t>Aim of R25 (RFA)</a:t>
+            </a:r>
+            <a:endParaRPr lang="en-US" dirty="0"/>
+          </a:p>
+        </p:txBody>
+      </p:sp>
+      <p:sp>
+        <p:nvSpPr>
+          <p:cNvPr id="3" name="Content Placeholder 2"/>
+          <p:cNvSpPr>
+            <a:spLocks noGrp="1"/>
+          </p:cNvSpPr>
+          <p:nvPr>
+            <p:ph idx="1"/>
+          </p:nvPr>
+        </p:nvSpPr>
+        <p:spPr/>
+        <p:txBody>
+          <a:bodyPr/>
+          <a:lstStyle/>
+          <a:p>
+            <a:endParaRPr lang="en-US"/>
+          </a:p>
+        </p:txBody>
+      </p:sp>
+    </p:spTree>
+    <p:extLst>
+      <p:ext uri="{BB962C8B-B14F-4D97-AF65-F5344CB8AC3E}">
+        <p14:creationId xmlns:p14="http://schemas.microsoft.com/office/powerpoint/2010/main" val="2592126552"/>
+      </p:ext>
+    </p:extLst>
+  </p:cSld>
+  <p:clrMapOvr>
+    <a:masterClrMapping/>
+  </p:clrMapOvr>
+</p:sld>
+</file>
+
+<file path=ppt/slides/slide5.xml><?xml version="1.0" encoding="utf-8"?>
+<p:sld xmlns:a="http://schemas.openxmlformats.org/drawingml/2006/main" xmlns:r="http://schemas.openxmlformats.org/officeDocument/2006/relationships" xmlns:p="http://schemas.openxmlformats.org/presentationml/2006/main">
+  <p:cSld>
+    <p:spTree>
+      <p:nvGrpSpPr>
+        <p:cNvPr id="1" name=""/>
+        <p:cNvGrpSpPr/>
+        <p:nvPr/>
+      </p:nvGrpSpPr>
+      <p:grpSpPr>
+        <a:xfrm>
+          <a:off x="0" y="0"/>
+          <a:ext cx="0" cy="0"/>
+          <a:chOff x="0" y="0"/>
+          <a:chExt cx="0" cy="0"/>
+        </a:xfrm>
+      </p:grpSpPr>
+      <p:sp>
+        <p:nvSpPr>
+          <p:cNvPr id="2" name="Title 1"/>
+          <p:cNvSpPr>
+            <a:spLocks noGrp="1"/>
+          </p:cNvSpPr>
+          <p:nvPr>
+            <p:ph type="title"/>
+          </p:nvPr>
+        </p:nvSpPr>
+        <p:spPr/>
+        <p:txBody>
+          <a:bodyPr/>
+          <a:lstStyle/>
+          <a:p>
+            <a:r>
+              <a:rPr lang="en-US" dirty="0" smtClean="0"/>
               <a:t>BIOSTARS</a:t>
             </a:r>
             <a:endParaRPr lang="en-US" dirty="0"/>
@@ -6401,7 +7538,7 @@
 </p:sld>
 </file>
 
-<file path=ppt/slides/slide5.xml><?xml version="1.0" encoding="utf-8"?>
+<file path=ppt/slides/slide6.xml><?xml version="1.0" encoding="utf-8"?>
 <p:sld xmlns:a="http://schemas.openxmlformats.org/drawingml/2006/main" xmlns:r="http://schemas.openxmlformats.org/officeDocument/2006/relationships" xmlns:p="http://schemas.openxmlformats.org/presentationml/2006/main">
   <p:cSld>
     <p:spTree>
@@ -6510,7 +7647,7 @@
 </p:sld>
 </file>
 
-<file path=ppt/slides/slide6.xml><?xml version="1.0" encoding="utf-8"?>
+<file path=ppt/slides/slide7.xml><?xml version="1.0" encoding="utf-8"?>
 <p:sld xmlns:a="http://schemas.openxmlformats.org/drawingml/2006/main" xmlns:r="http://schemas.openxmlformats.org/officeDocument/2006/relationships" xmlns:p="http://schemas.openxmlformats.org/presentationml/2006/main">
   <p:cSld>
     <p:spTree>
@@ -6623,7 +7760,7 @@
 </p:sld>
 </file>
 
-<file path=ppt/slides/slide7.xml><?xml version="1.0" encoding="utf-8"?>
+<file path=ppt/slides/slide8.xml><?xml version="1.0" encoding="utf-8"?>
 <p:sld xmlns:a="http://schemas.openxmlformats.org/drawingml/2006/main" xmlns:r="http://schemas.openxmlformats.org/officeDocument/2006/relationships" xmlns:p="http://schemas.openxmlformats.org/presentationml/2006/main">
   <p:cSld>
     <p:spTree>
@@ -6791,7 +7928,7 @@
 </p:sld>
 </file>
 
-<file path=ppt/slides/slide8.xml><?xml version="1.0" encoding="utf-8"?>
+<file path=ppt/slides/slide9.xml><?xml version="1.0" encoding="utf-8"?>
 <p:sld xmlns:a="http://schemas.openxmlformats.org/drawingml/2006/main" xmlns:r="http://schemas.openxmlformats.org/officeDocument/2006/relationships" xmlns:p="http://schemas.openxmlformats.org/presentationml/2006/main">
   <p:cSld>
     <p:spTree>
@@ -7126,813 +8263,6 @@
     <p:extLst>
       <p:ext uri="{BB962C8B-B14F-4D97-AF65-F5344CB8AC3E}">
         <p14:creationId xmlns:p14="http://schemas.microsoft.com/office/powerpoint/2010/main" val="3800060078"/>
-      </p:ext>
-    </p:extLst>
-  </p:cSld>
-  <p:clrMapOvr>
-    <a:masterClrMapping/>
-  </p:clrMapOvr>
-  <p:timing>
-    <p:tnLst>
-      <p:par>
-        <p:cTn id="1" dur="indefinite" restart="never" nodeType="tmRoot"/>
-      </p:par>
-    </p:tnLst>
-  </p:timing>
-</p:sld>
-</file>
-
-<file path=ppt/slides/slide9.xml><?xml version="1.0" encoding="utf-8"?>
-<p:sld xmlns:a="http://schemas.openxmlformats.org/drawingml/2006/main" xmlns:r="http://schemas.openxmlformats.org/officeDocument/2006/relationships" xmlns:p="http://schemas.openxmlformats.org/presentationml/2006/main">
-  <p:cSld>
-    <p:spTree>
-      <p:nvGrpSpPr>
-        <p:cNvPr id="1" name=""/>
-        <p:cNvGrpSpPr/>
-        <p:nvPr/>
-      </p:nvGrpSpPr>
-      <p:grpSpPr>
-        <a:xfrm>
-          <a:off x="0" y="0"/>
-          <a:ext cx="0" cy="0"/>
-          <a:chOff x="0" y="0"/>
-          <a:chExt cx="0" cy="0"/>
-        </a:xfrm>
-      </p:grpSpPr>
-      <p:sp>
-        <p:nvSpPr>
-          <p:cNvPr id="7" name="Rectangle 6"/>
-          <p:cNvSpPr/>
-          <p:nvPr/>
-        </p:nvSpPr>
-        <p:spPr>
-          <a:xfrm>
-            <a:off x="2971800" y="2429608"/>
-            <a:ext cx="2209800" cy="3056792"/>
-          </a:xfrm>
-          <a:prstGeom prst="rect">
-            <a:avLst/>
-          </a:prstGeom>
-          <a:solidFill>
-            <a:schemeClr val="accent2">
-              <a:lumMod val="40000"/>
-              <a:lumOff val="60000"/>
-            </a:schemeClr>
-          </a:solidFill>
-        </p:spPr>
-        <p:style>
-          <a:lnRef idx="2">
-            <a:schemeClr val="accent1">
-              <a:shade val="50000"/>
-            </a:schemeClr>
-          </a:lnRef>
-          <a:fillRef idx="1">
-            <a:schemeClr val="accent1"/>
-          </a:fillRef>
-          <a:effectRef idx="0">
-            <a:schemeClr val="accent1"/>
-          </a:effectRef>
-          <a:fontRef idx="minor">
-            <a:schemeClr val="lt1"/>
-          </a:fontRef>
-        </p:style>
-        <p:txBody>
-          <a:bodyPr rtlCol="0" anchor="ctr"/>
-          <a:lstStyle/>
-          <a:p>
-            <a:pPr algn="ctr"/>
-            <a:endParaRPr lang="en-US" dirty="0"/>
-          </a:p>
-        </p:txBody>
-      </p:sp>
-      <p:sp>
-        <p:nvSpPr>
-          <p:cNvPr id="2" name="Title 1"/>
-          <p:cNvSpPr>
-            <a:spLocks noGrp="1"/>
-          </p:cNvSpPr>
-          <p:nvPr>
-            <p:ph type="title"/>
-          </p:nvPr>
-        </p:nvSpPr>
-        <p:spPr>
-          <a:xfrm>
-            <a:off x="457200" y="-76200"/>
-            <a:ext cx="8229600" cy="1143000"/>
-          </a:xfrm>
-        </p:spPr>
-        <p:txBody>
-          <a:bodyPr/>
-          <a:lstStyle/>
-          <a:p>
-            <a:r>
-              <a:rPr lang="en-US" dirty="0" smtClean="0"/>
-              <a:t>Structured wiki</a:t>
-            </a:r>
-            <a:endParaRPr lang="en-US" dirty="0"/>
-          </a:p>
-        </p:txBody>
-      </p:sp>
-      <p:sp>
-        <p:nvSpPr>
-          <p:cNvPr id="4" name="Rectangle 3"/>
-          <p:cNvSpPr/>
-          <p:nvPr/>
-        </p:nvSpPr>
-        <p:spPr>
-          <a:xfrm>
-            <a:off x="533400" y="3505200"/>
-            <a:ext cx="1828800" cy="533400"/>
-          </a:xfrm>
-          <a:prstGeom prst="rect">
-            <a:avLst/>
-          </a:prstGeom>
-        </p:spPr>
-        <p:style>
-          <a:lnRef idx="2">
-            <a:schemeClr val="accent1">
-              <a:shade val="50000"/>
-            </a:schemeClr>
-          </a:lnRef>
-          <a:fillRef idx="1">
-            <a:schemeClr val="accent1"/>
-          </a:fillRef>
-          <a:effectRef idx="0">
-            <a:schemeClr val="accent1"/>
-          </a:effectRef>
-          <a:fontRef idx="minor">
-            <a:schemeClr val="lt1"/>
-          </a:fontRef>
-        </p:style>
-        <p:txBody>
-          <a:bodyPr rtlCol="0" anchor="ctr"/>
-          <a:lstStyle/>
-          <a:p>
-            <a:pPr algn="ctr"/>
-            <a:r>
-              <a:rPr lang="en-US" dirty="0" smtClean="0"/>
-              <a:t>NGS analysis</a:t>
-            </a:r>
-            <a:endParaRPr lang="en-US" dirty="0"/>
-          </a:p>
-        </p:txBody>
-      </p:sp>
-      <p:sp>
-        <p:nvSpPr>
-          <p:cNvPr id="5" name="Rectangle 4"/>
-          <p:cNvSpPr/>
-          <p:nvPr/>
-        </p:nvSpPr>
-        <p:spPr>
-          <a:xfrm>
-            <a:off x="3200400" y="1828800"/>
-            <a:ext cx="1828800" cy="533400"/>
-          </a:xfrm>
-          <a:prstGeom prst="rect">
-            <a:avLst/>
-          </a:prstGeom>
-        </p:spPr>
-        <p:style>
-          <a:lnRef idx="2">
-            <a:schemeClr val="accent1">
-              <a:shade val="50000"/>
-            </a:schemeClr>
-          </a:lnRef>
-          <a:fillRef idx="1">
-            <a:schemeClr val="accent1"/>
-          </a:fillRef>
-          <a:effectRef idx="0">
-            <a:schemeClr val="accent1"/>
-          </a:effectRef>
-          <a:fontRef idx="minor">
-            <a:schemeClr val="lt1"/>
-          </a:fontRef>
-        </p:style>
-        <p:txBody>
-          <a:bodyPr rtlCol="0" anchor="ctr"/>
-          <a:lstStyle/>
-          <a:p>
-            <a:pPr algn="ctr"/>
-            <a:r>
-              <a:rPr lang="en-US" dirty="0" smtClean="0"/>
-              <a:t>Alignment</a:t>
-            </a:r>
-            <a:endParaRPr lang="en-US" dirty="0"/>
-          </a:p>
-        </p:txBody>
-      </p:sp>
-      <p:sp>
-        <p:nvSpPr>
-          <p:cNvPr id="6" name="Rectangle 5"/>
-          <p:cNvSpPr/>
-          <p:nvPr/>
-        </p:nvSpPr>
-        <p:spPr>
-          <a:xfrm>
-            <a:off x="3200400" y="2667000"/>
-            <a:ext cx="1828800" cy="533400"/>
-          </a:xfrm>
-          <a:prstGeom prst="rect">
-            <a:avLst/>
-          </a:prstGeom>
-        </p:spPr>
-        <p:style>
-          <a:lnRef idx="2">
-            <a:schemeClr val="accent1">
-              <a:shade val="50000"/>
-            </a:schemeClr>
-          </a:lnRef>
-          <a:fillRef idx="1">
-            <a:schemeClr val="accent1"/>
-          </a:fillRef>
-          <a:effectRef idx="0">
-            <a:schemeClr val="accent1"/>
-          </a:effectRef>
-          <a:fontRef idx="minor">
-            <a:schemeClr val="lt1"/>
-          </a:fontRef>
-        </p:style>
-        <p:txBody>
-          <a:bodyPr rtlCol="0" anchor="ctr"/>
-          <a:lstStyle/>
-          <a:p>
-            <a:pPr algn="ctr"/>
-            <a:r>
-              <a:rPr lang="en-US" dirty="0" err="1" smtClean="0"/>
-              <a:t>ChIP-Seq</a:t>
-            </a:r>
-            <a:endParaRPr lang="en-US" dirty="0"/>
-          </a:p>
-        </p:txBody>
-      </p:sp>
-      <p:sp>
-        <p:nvSpPr>
-          <p:cNvPr id="8" name="Rectangle 7"/>
-          <p:cNvSpPr/>
-          <p:nvPr/>
-        </p:nvSpPr>
-        <p:spPr>
-          <a:xfrm>
-            <a:off x="3200400" y="3352800"/>
-            <a:ext cx="1828800" cy="533400"/>
-          </a:xfrm>
-          <a:prstGeom prst="rect">
-            <a:avLst/>
-          </a:prstGeom>
-        </p:spPr>
-        <p:style>
-          <a:lnRef idx="2">
-            <a:schemeClr val="accent1">
-              <a:shade val="50000"/>
-            </a:schemeClr>
-          </a:lnRef>
-          <a:fillRef idx="1">
-            <a:schemeClr val="accent1"/>
-          </a:fillRef>
-          <a:effectRef idx="0">
-            <a:schemeClr val="accent1"/>
-          </a:effectRef>
-          <a:fontRef idx="minor">
-            <a:schemeClr val="lt1"/>
-          </a:fontRef>
-        </p:style>
-        <p:txBody>
-          <a:bodyPr rtlCol="0" anchor="ctr"/>
-          <a:lstStyle/>
-          <a:p>
-            <a:pPr algn="ctr"/>
-            <a:r>
-              <a:rPr lang="en-US" dirty="0" smtClean="0"/>
-              <a:t>RNA-</a:t>
-            </a:r>
-            <a:r>
-              <a:rPr lang="en-US" dirty="0" err="1" smtClean="0"/>
-              <a:t>Seq</a:t>
-            </a:r>
-            <a:endParaRPr lang="en-US" dirty="0"/>
-          </a:p>
-        </p:txBody>
-      </p:sp>
-      <p:sp>
-        <p:nvSpPr>
-          <p:cNvPr id="9" name="Rectangle 8"/>
-          <p:cNvSpPr/>
-          <p:nvPr/>
-        </p:nvSpPr>
-        <p:spPr>
-          <a:xfrm>
-            <a:off x="3200400" y="4038600"/>
-            <a:ext cx="1828800" cy="533400"/>
-          </a:xfrm>
-          <a:prstGeom prst="rect">
-            <a:avLst/>
-          </a:prstGeom>
-        </p:spPr>
-        <p:style>
-          <a:lnRef idx="2">
-            <a:schemeClr val="accent1">
-              <a:shade val="50000"/>
-            </a:schemeClr>
-          </a:lnRef>
-          <a:fillRef idx="1">
-            <a:schemeClr val="accent1"/>
-          </a:fillRef>
-          <a:effectRef idx="0">
-            <a:schemeClr val="accent1"/>
-          </a:effectRef>
-          <a:fontRef idx="minor">
-            <a:schemeClr val="lt1"/>
-          </a:fontRef>
-        </p:style>
-        <p:txBody>
-          <a:bodyPr rtlCol="0" anchor="ctr"/>
-          <a:lstStyle/>
-          <a:p>
-            <a:pPr algn="ctr"/>
-            <a:r>
-              <a:rPr lang="en-US" dirty="0" smtClean="0"/>
-              <a:t>Variant calling</a:t>
-            </a:r>
-            <a:endParaRPr lang="en-US" dirty="0"/>
-          </a:p>
-        </p:txBody>
-      </p:sp>
-      <p:sp>
-        <p:nvSpPr>
-          <p:cNvPr id="10" name="Rectangle 9"/>
-          <p:cNvSpPr/>
-          <p:nvPr/>
-        </p:nvSpPr>
-        <p:spPr>
-          <a:xfrm>
-            <a:off x="3200400" y="4724400"/>
-            <a:ext cx="1828800" cy="533400"/>
-          </a:xfrm>
-          <a:prstGeom prst="rect">
-            <a:avLst/>
-          </a:prstGeom>
-        </p:spPr>
-        <p:style>
-          <a:lnRef idx="2">
-            <a:schemeClr val="accent1">
-              <a:shade val="50000"/>
-            </a:schemeClr>
-          </a:lnRef>
-          <a:fillRef idx="1">
-            <a:schemeClr val="accent1"/>
-          </a:fillRef>
-          <a:effectRef idx="0">
-            <a:schemeClr val="accent1"/>
-          </a:effectRef>
-          <a:fontRef idx="minor">
-            <a:schemeClr val="lt1"/>
-          </a:fontRef>
-        </p:style>
-        <p:txBody>
-          <a:bodyPr rtlCol="0" anchor="ctr"/>
-          <a:lstStyle/>
-          <a:p>
-            <a:pPr algn="ctr"/>
-            <a:r>
-              <a:rPr lang="en-US" dirty="0" smtClean="0"/>
-              <a:t>…</a:t>
-            </a:r>
-            <a:endParaRPr lang="en-US" dirty="0"/>
-          </a:p>
-        </p:txBody>
-      </p:sp>
-      <p:sp>
-        <p:nvSpPr>
-          <p:cNvPr id="12" name="Left Brace 11"/>
-          <p:cNvSpPr/>
-          <p:nvPr/>
-        </p:nvSpPr>
-        <p:spPr>
-          <a:xfrm>
-            <a:off x="2438400" y="1409700"/>
-            <a:ext cx="457200" cy="4991100"/>
-          </a:xfrm>
-          <a:prstGeom prst="leftBrace">
-            <a:avLst/>
-          </a:prstGeom>
-        </p:spPr>
-        <p:style>
-          <a:lnRef idx="1">
-            <a:schemeClr val="accent1"/>
-          </a:lnRef>
-          <a:fillRef idx="0">
-            <a:schemeClr val="accent1"/>
-          </a:fillRef>
-          <a:effectRef idx="0">
-            <a:schemeClr val="accent1"/>
-          </a:effectRef>
-          <a:fontRef idx="minor">
-            <a:schemeClr val="tx1"/>
-          </a:fontRef>
-        </p:style>
-        <p:txBody>
-          <a:bodyPr rtlCol="0" anchor="ctr"/>
-          <a:lstStyle/>
-          <a:p>
-            <a:pPr algn="ctr"/>
-            <a:endParaRPr lang="en-US"/>
-          </a:p>
-        </p:txBody>
-      </p:sp>
-      <p:sp>
-        <p:nvSpPr>
-          <p:cNvPr id="13" name="Left Brace 12"/>
-          <p:cNvSpPr/>
-          <p:nvPr/>
-        </p:nvSpPr>
-        <p:spPr>
-          <a:xfrm>
-            <a:off x="5105400" y="1562100"/>
-            <a:ext cx="457200" cy="2705100"/>
-          </a:xfrm>
-          <a:prstGeom prst="leftBrace">
-            <a:avLst/>
-          </a:prstGeom>
-        </p:spPr>
-        <p:style>
-          <a:lnRef idx="1">
-            <a:schemeClr val="accent1"/>
-          </a:lnRef>
-          <a:fillRef idx="0">
-            <a:schemeClr val="accent1"/>
-          </a:fillRef>
-          <a:effectRef idx="0">
-            <a:schemeClr val="accent1"/>
-          </a:effectRef>
-          <a:fontRef idx="minor">
-            <a:schemeClr val="tx1"/>
-          </a:fontRef>
-        </p:style>
-        <p:txBody>
-          <a:bodyPr rtlCol="0" anchor="ctr"/>
-          <a:lstStyle/>
-          <a:p>
-            <a:pPr algn="ctr"/>
-            <a:endParaRPr lang="en-US"/>
-          </a:p>
-        </p:txBody>
-      </p:sp>
-      <p:sp>
-        <p:nvSpPr>
-          <p:cNvPr id="15" name="Rectangle 14"/>
-          <p:cNvSpPr/>
-          <p:nvPr/>
-        </p:nvSpPr>
-        <p:spPr>
-          <a:xfrm>
-            <a:off x="5715000" y="1295400"/>
-            <a:ext cx="1828800" cy="533400"/>
-          </a:xfrm>
-          <a:prstGeom prst="rect">
-            <a:avLst/>
-          </a:prstGeom>
-        </p:spPr>
-        <p:style>
-          <a:lnRef idx="2">
-            <a:schemeClr val="accent1">
-              <a:shade val="50000"/>
-            </a:schemeClr>
-          </a:lnRef>
-          <a:fillRef idx="1">
-            <a:schemeClr val="accent1"/>
-          </a:fillRef>
-          <a:effectRef idx="0">
-            <a:schemeClr val="accent1"/>
-          </a:effectRef>
-          <a:fontRef idx="minor">
-            <a:schemeClr val="lt1"/>
-          </a:fontRef>
-        </p:style>
-        <p:txBody>
-          <a:bodyPr rtlCol="0" anchor="ctr"/>
-          <a:lstStyle/>
-          <a:p>
-            <a:pPr algn="ctr"/>
-            <a:r>
-              <a:rPr lang="en-US" dirty="0" smtClean="0"/>
-              <a:t>Shift size estimation</a:t>
-            </a:r>
-            <a:endParaRPr lang="en-US" dirty="0"/>
-          </a:p>
-        </p:txBody>
-      </p:sp>
-      <p:sp>
-        <p:nvSpPr>
-          <p:cNvPr id="16" name="Rectangle 15"/>
-          <p:cNvSpPr/>
-          <p:nvPr/>
-        </p:nvSpPr>
-        <p:spPr>
-          <a:xfrm>
-            <a:off x="5732585" y="2596662"/>
-            <a:ext cx="1828800" cy="533400"/>
-          </a:xfrm>
-          <a:prstGeom prst="rect">
-            <a:avLst/>
-          </a:prstGeom>
-        </p:spPr>
-        <p:style>
-          <a:lnRef idx="2">
-            <a:schemeClr val="accent1">
-              <a:shade val="50000"/>
-            </a:schemeClr>
-          </a:lnRef>
-          <a:fillRef idx="1">
-            <a:schemeClr val="accent1"/>
-          </a:fillRef>
-          <a:effectRef idx="0">
-            <a:schemeClr val="accent1"/>
-          </a:effectRef>
-          <a:fontRef idx="minor">
-            <a:schemeClr val="lt1"/>
-          </a:fontRef>
-        </p:style>
-        <p:txBody>
-          <a:bodyPr rtlCol="0" anchor="ctr"/>
-          <a:lstStyle/>
-          <a:p>
-            <a:pPr algn="ctr"/>
-            <a:r>
-              <a:rPr lang="en-US" dirty="0" smtClean="0"/>
-              <a:t>Statistical testing</a:t>
-            </a:r>
-            <a:endParaRPr lang="en-US" dirty="0"/>
-          </a:p>
-        </p:txBody>
-      </p:sp>
-      <p:sp>
-        <p:nvSpPr>
-          <p:cNvPr id="17" name="Rectangle 16"/>
-          <p:cNvSpPr/>
-          <p:nvPr/>
-        </p:nvSpPr>
-        <p:spPr>
-          <a:xfrm>
-            <a:off x="5732585" y="3358662"/>
-            <a:ext cx="1828800" cy="533400"/>
-          </a:xfrm>
-          <a:prstGeom prst="rect">
-            <a:avLst/>
-          </a:prstGeom>
-        </p:spPr>
-        <p:style>
-          <a:lnRef idx="2">
-            <a:schemeClr val="accent1">
-              <a:shade val="50000"/>
-            </a:schemeClr>
-          </a:lnRef>
-          <a:fillRef idx="1">
-            <a:schemeClr val="accent1"/>
-          </a:fillRef>
-          <a:effectRef idx="0">
-            <a:schemeClr val="accent1"/>
-          </a:effectRef>
-          <a:fontRef idx="minor">
-            <a:schemeClr val="lt1"/>
-          </a:fontRef>
-        </p:style>
-        <p:txBody>
-          <a:bodyPr rtlCol="0" anchor="ctr"/>
-          <a:lstStyle/>
-          <a:p>
-            <a:pPr algn="ctr"/>
-            <a:r>
-              <a:rPr lang="en-US" dirty="0" smtClean="0"/>
-              <a:t>Post-processing</a:t>
-            </a:r>
-            <a:endParaRPr lang="en-US" dirty="0"/>
-          </a:p>
-        </p:txBody>
-      </p:sp>
-      <p:sp>
-        <p:nvSpPr>
-          <p:cNvPr id="18" name="Rectangle 17"/>
-          <p:cNvSpPr/>
-          <p:nvPr/>
-        </p:nvSpPr>
-        <p:spPr>
-          <a:xfrm>
-            <a:off x="5715000" y="1913792"/>
-            <a:ext cx="1828800" cy="533400"/>
-          </a:xfrm>
-          <a:prstGeom prst="rect">
-            <a:avLst/>
-          </a:prstGeom>
-        </p:spPr>
-        <p:style>
-          <a:lnRef idx="2">
-            <a:schemeClr val="accent1">
-              <a:shade val="50000"/>
-            </a:schemeClr>
-          </a:lnRef>
-          <a:fillRef idx="1">
-            <a:schemeClr val="accent1"/>
-          </a:fillRef>
-          <a:effectRef idx="0">
-            <a:schemeClr val="accent1"/>
-          </a:effectRef>
-          <a:fontRef idx="minor">
-            <a:schemeClr val="lt1"/>
-          </a:fontRef>
-        </p:style>
-        <p:txBody>
-          <a:bodyPr rtlCol="0" anchor="ctr"/>
-          <a:lstStyle/>
-          <a:p>
-            <a:pPr algn="ctr"/>
-            <a:r>
-              <a:rPr lang="en-US" dirty="0" smtClean="0"/>
-              <a:t>Normalization</a:t>
-            </a:r>
-            <a:endParaRPr lang="en-US" dirty="0"/>
-          </a:p>
-        </p:txBody>
-      </p:sp>
-      <p:sp>
-        <p:nvSpPr>
-          <p:cNvPr id="19" name="Rectangle 18"/>
-          <p:cNvSpPr/>
-          <p:nvPr/>
-        </p:nvSpPr>
-        <p:spPr>
-          <a:xfrm>
-            <a:off x="5756031" y="4070839"/>
-            <a:ext cx="1828800" cy="533400"/>
-          </a:xfrm>
-          <a:prstGeom prst="rect">
-            <a:avLst/>
-          </a:prstGeom>
-        </p:spPr>
-        <p:style>
-          <a:lnRef idx="2">
-            <a:schemeClr val="accent1">
-              <a:shade val="50000"/>
-            </a:schemeClr>
-          </a:lnRef>
-          <a:fillRef idx="1">
-            <a:schemeClr val="accent1"/>
-          </a:fillRef>
-          <a:effectRef idx="0">
-            <a:schemeClr val="accent1"/>
-          </a:effectRef>
-          <a:fontRef idx="minor">
-            <a:schemeClr val="lt1"/>
-          </a:fontRef>
-        </p:style>
-        <p:txBody>
-          <a:bodyPr rtlCol="0" anchor="ctr"/>
-          <a:lstStyle/>
-          <a:p>
-            <a:pPr algn="ctr"/>
-            <a:r>
-              <a:rPr lang="en-US" dirty="0" smtClean="0"/>
-              <a:t>Blacklisted regions</a:t>
-            </a:r>
-            <a:endParaRPr lang="en-US" dirty="0"/>
-          </a:p>
-        </p:txBody>
-      </p:sp>
-      <p:sp>
-        <p:nvSpPr>
-          <p:cNvPr id="20" name="Rectangle 19"/>
-          <p:cNvSpPr/>
-          <p:nvPr/>
-        </p:nvSpPr>
-        <p:spPr>
-          <a:xfrm>
-            <a:off x="3200400" y="5638800"/>
-            <a:ext cx="1828800" cy="533400"/>
-          </a:xfrm>
-          <a:prstGeom prst="rect">
-            <a:avLst/>
-          </a:prstGeom>
-        </p:spPr>
-        <p:style>
-          <a:lnRef idx="2">
-            <a:schemeClr val="accent1">
-              <a:shade val="50000"/>
-            </a:schemeClr>
-          </a:lnRef>
-          <a:fillRef idx="1">
-            <a:schemeClr val="accent1"/>
-          </a:fillRef>
-          <a:effectRef idx="0">
-            <a:schemeClr val="accent1"/>
-          </a:effectRef>
-          <a:fontRef idx="minor">
-            <a:schemeClr val="lt1"/>
-          </a:fontRef>
-        </p:style>
-        <p:txBody>
-          <a:bodyPr rtlCol="0" anchor="ctr"/>
-          <a:lstStyle/>
-          <a:p>
-            <a:pPr algn="ctr"/>
-            <a:r>
-              <a:rPr lang="en-US" dirty="0" smtClean="0"/>
-              <a:t>Enrichment testing</a:t>
-            </a:r>
-            <a:endParaRPr lang="en-US" dirty="0"/>
-          </a:p>
-        </p:txBody>
-      </p:sp>
-      <p:sp>
-        <p:nvSpPr>
-          <p:cNvPr id="22" name="Rectangle 21"/>
-          <p:cNvSpPr/>
-          <p:nvPr/>
-        </p:nvSpPr>
-        <p:spPr>
-          <a:xfrm>
-            <a:off x="3200400" y="1143000"/>
-            <a:ext cx="1828800" cy="533400"/>
-          </a:xfrm>
-          <a:prstGeom prst="rect">
-            <a:avLst/>
-          </a:prstGeom>
-        </p:spPr>
-        <p:style>
-          <a:lnRef idx="2">
-            <a:schemeClr val="accent1">
-              <a:shade val="50000"/>
-            </a:schemeClr>
-          </a:lnRef>
-          <a:fillRef idx="1">
-            <a:schemeClr val="accent1"/>
-          </a:fillRef>
-          <a:effectRef idx="0">
-            <a:schemeClr val="accent1"/>
-          </a:effectRef>
-          <a:fontRef idx="minor">
-            <a:schemeClr val="lt1"/>
-          </a:fontRef>
-        </p:style>
-        <p:txBody>
-          <a:bodyPr rtlCol="0" anchor="ctr"/>
-          <a:lstStyle/>
-          <a:p>
-            <a:pPr algn="ctr"/>
-            <a:r>
-              <a:rPr lang="en-US" dirty="0" smtClean="0"/>
-              <a:t>QC checks</a:t>
-            </a:r>
-            <a:endParaRPr lang="en-US" dirty="0"/>
-          </a:p>
-        </p:txBody>
-      </p:sp>
-      <p:sp>
-        <p:nvSpPr>
-          <p:cNvPr id="23" name="Rectangle 22"/>
-          <p:cNvSpPr/>
-          <p:nvPr/>
-        </p:nvSpPr>
-        <p:spPr>
-          <a:xfrm>
-            <a:off x="3200400" y="6301154"/>
-            <a:ext cx="1828800" cy="533400"/>
-          </a:xfrm>
-          <a:prstGeom prst="rect">
-            <a:avLst/>
-          </a:prstGeom>
-        </p:spPr>
-        <p:style>
-          <a:lnRef idx="2">
-            <a:schemeClr val="accent1">
-              <a:shade val="50000"/>
-            </a:schemeClr>
-          </a:lnRef>
-          <a:fillRef idx="1">
-            <a:schemeClr val="accent1"/>
-          </a:fillRef>
-          <a:effectRef idx="0">
-            <a:schemeClr val="accent1"/>
-          </a:effectRef>
-          <a:fontRef idx="minor">
-            <a:schemeClr val="lt1"/>
-          </a:fontRef>
-        </p:style>
-        <p:txBody>
-          <a:bodyPr rtlCol="0" anchor="ctr"/>
-          <a:lstStyle/>
-          <a:p>
-            <a:pPr algn="ctr"/>
-            <a:r>
-              <a:rPr lang="en-US" dirty="0" smtClean="0"/>
-              <a:t>Access to public data repository</a:t>
-            </a:r>
-            <a:endParaRPr lang="en-US" dirty="0"/>
-          </a:p>
-        </p:txBody>
-      </p:sp>
-    </p:spTree>
-    <p:extLst>
-      <p:ext uri="{BB962C8B-B14F-4D97-AF65-F5344CB8AC3E}">
-        <p14:creationId xmlns:p14="http://schemas.microsoft.com/office/powerpoint/2010/main" val="1489236265"/>
       </p:ext>
     </p:extLst>
   </p:cSld>

</xml_diff>